<commit_message>
make some change in README.pptx
</commit_message>
<xml_diff>
--- a/docs/tomoko/mid_presen.pptx
+++ b/docs/tomoko/mid_presen.pptx
@@ -10,8 +10,9 @@
     <p:sldId id="257" r:id="rId4"/>
     <p:sldId id="261" r:id="rId5"/>
     <p:sldId id="260" r:id="rId6"/>
-    <p:sldId id="263" r:id="rId7"/>
-    <p:sldId id="258" r:id="rId8"/>
+    <p:sldId id="264" r:id="rId7"/>
+    <p:sldId id="263" r:id="rId8"/>
+    <p:sldId id="258" r:id="rId9"/>
   </p:sldIdLst>
   <p:sldSz cx="12192000" cy="6858000"/>
   <p:notesSz cx="6858000" cy="9144000"/>
@@ -266,7 +267,7 @@
             <a:fld id="{5586B75A-687E-405C-8A0B-8D00578BA2C3}" type="datetimeFigureOut">
               <a:rPr lang="en-US" smtClean="0"/>
               <a:pPr/>
-              <a:t>9/16/18</a:t>
+              <a:t>9/17/18</a:t>
             </a:fld>
             <a:endParaRPr lang="en-US" dirty="0"/>
           </a:p>
@@ -473,7 +474,7 @@
             <a:fld id="{5586B75A-687E-405C-8A0B-8D00578BA2C3}" type="datetimeFigureOut">
               <a:rPr lang="en-US" smtClean="0"/>
               <a:pPr/>
-              <a:t>9/16/18</a:t>
+              <a:t>9/17/18</a:t>
             </a:fld>
             <a:endParaRPr lang="en-US" dirty="0"/>
           </a:p>
@@ -690,7 +691,7 @@
             <a:fld id="{5586B75A-687E-405C-8A0B-8D00578BA2C3}" type="datetimeFigureOut">
               <a:rPr lang="en-US" smtClean="0"/>
               <a:pPr/>
-              <a:t>9/16/18</a:t>
+              <a:t>9/17/18</a:t>
             </a:fld>
             <a:endParaRPr lang="en-US" dirty="0"/>
           </a:p>
@@ -897,7 +898,7 @@
             <a:fld id="{5586B75A-687E-405C-8A0B-8D00578BA2C3}" type="datetimeFigureOut">
               <a:rPr lang="en-US" smtClean="0"/>
               <a:pPr/>
-              <a:t>9/16/18</a:t>
+              <a:t>9/17/18</a:t>
             </a:fld>
             <a:endParaRPr lang="en-US" dirty="0"/>
           </a:p>
@@ -1209,7 +1210,7 @@
             <a:fld id="{5586B75A-687E-405C-8A0B-8D00578BA2C3}" type="datetimeFigureOut">
               <a:rPr lang="en-US" smtClean="0"/>
               <a:pPr/>
-              <a:t>9/16/18</a:t>
+              <a:t>9/17/18</a:t>
             </a:fld>
             <a:endParaRPr lang="en-US" dirty="0"/>
           </a:p>
@@ -1490,7 +1491,7 @@
             <a:fld id="{5586B75A-687E-405C-8A0B-8D00578BA2C3}" type="datetimeFigureOut">
               <a:rPr lang="en-US" smtClean="0"/>
               <a:pPr/>
-              <a:t>9/16/18</a:t>
+              <a:t>9/17/18</a:t>
             </a:fld>
             <a:endParaRPr lang="en-US" dirty="0"/>
           </a:p>
@@ -1988,7 +1989,7 @@
             <a:fld id="{5586B75A-687E-405C-8A0B-8D00578BA2C3}" type="datetimeFigureOut">
               <a:rPr lang="en-US" smtClean="0"/>
               <a:pPr/>
-              <a:t>9/16/18</a:t>
+              <a:t>9/17/18</a:t>
             </a:fld>
             <a:endParaRPr lang="en-US" dirty="0"/>
           </a:p>
@@ -2131,7 +2132,7 @@
             <a:fld id="{5586B75A-687E-405C-8A0B-8D00578BA2C3}" type="datetimeFigureOut">
               <a:rPr lang="en-US" smtClean="0"/>
               <a:pPr/>
-              <a:t>9/16/18</a:t>
+              <a:t>9/17/18</a:t>
             </a:fld>
             <a:endParaRPr lang="en-US" dirty="0"/>
           </a:p>
@@ -2246,7 +2247,7 @@
             <a:fld id="{5586B75A-687E-405C-8A0B-8D00578BA2C3}" type="datetimeFigureOut">
               <a:rPr lang="en-US" smtClean="0"/>
               <a:pPr/>
-              <a:t>9/16/18</a:t>
+              <a:t>9/17/18</a:t>
             </a:fld>
             <a:endParaRPr lang="en-US" dirty="0"/>
           </a:p>
@@ -2601,7 +2602,7 @@
             <a:fld id="{5586B75A-687E-405C-8A0B-8D00578BA2C3}" type="datetimeFigureOut">
               <a:rPr lang="en-US" smtClean="0"/>
               <a:pPr/>
-              <a:t>9/16/18</a:t>
+              <a:t>9/17/18</a:t>
             </a:fld>
             <a:endParaRPr lang="en-US" dirty="0"/>
           </a:p>
@@ -2926,7 +2927,7 @@
             <a:fld id="{5586B75A-687E-405C-8A0B-8D00578BA2C3}" type="datetimeFigureOut">
               <a:rPr lang="en-US" smtClean="0"/>
               <a:pPr/>
-              <a:t>9/16/18</a:t>
+              <a:t>9/17/18</a:t>
             </a:fld>
             <a:endParaRPr lang="en-US" dirty="0"/>
           </a:p>
@@ -3177,7 +3178,7 @@
             <a:fld id="{5586B75A-687E-405C-8A0B-8D00578BA2C3}" type="datetimeFigureOut">
               <a:rPr lang="en-US" smtClean="0"/>
               <a:pPr/>
-              <a:t>9/16/18</a:t>
+              <a:t>9/17/18</a:t>
             </a:fld>
             <a:endParaRPr lang="en-US" dirty="0"/>
           </a:p>
@@ -3765,10 +3766,10 @@
       </p:sp>
       <p:sp>
         <p:nvSpPr>
-          <p:cNvPr id="3" name="星 16 2">
-            <a:extLst>
-              <a:ext uri="{FF2B5EF4-FFF2-40B4-BE49-F238E27FC236}">
-                <a16:creationId xmlns:a16="http://schemas.microsoft.com/office/drawing/2014/main" id="{574B543D-D407-1944-8F4D-2D355609461E}"/>
+          <p:cNvPr id="5" name="右矢印 4">
+            <a:extLst>
+              <a:ext uri="{FF2B5EF4-FFF2-40B4-BE49-F238E27FC236}">
+                <a16:creationId xmlns:a16="http://schemas.microsoft.com/office/drawing/2014/main" id="{31F31E48-8A04-DF4D-A7B4-8D9316BE7F41}"/>
               </a:ext>
             </a:extLst>
           </p:cNvPr>
@@ -3777,23 +3778,15 @@
         </p:nvSpPr>
         <p:spPr>
           <a:xfrm>
-            <a:off x="0" y="1563758"/>
-            <a:ext cx="12085983" cy="4717772"/>
+            <a:off x="562677" y="2700628"/>
+            <a:ext cx="2092841" cy="1921476"/>
           </a:xfrm>
-          <a:prstGeom prst="star16">
+          <a:prstGeom prst="rightArrow">
             <a:avLst/>
           </a:prstGeom>
           <a:solidFill>
-            <a:schemeClr val="accent4">
-              <a:lumMod val="40000"/>
-              <a:lumOff val="60000"/>
-            </a:schemeClr>
+            <a:schemeClr val="accent1"/>
           </a:solidFill>
-          <a:ln>
-            <a:solidFill>
-              <a:schemeClr val="bg1"/>
-            </a:solidFill>
-          </a:ln>
         </p:spPr>
         <p:style>
           <a:lnRef idx="2">
@@ -3812,51 +3805,81 @@
           </a:fontRef>
         </p:style>
         <p:txBody>
-          <a:bodyPr lIns="108000" tIns="72000" rIns="108000" bIns="72000" rtlCol="0" anchor="ctr">
-            <a:noAutofit/>
+          <a:bodyPr rtlCol="0" anchor="ctr"/>
+          <a:lstStyle/>
+          <a:p>
+            <a:pPr algn="ctr"/>
+            <a:endParaRPr kumimoji="1" lang="ja-JP" altLang="en-US"/>
+          </a:p>
+        </p:txBody>
+      </p:sp>
+      <p:sp>
+        <p:nvSpPr>
+          <p:cNvPr id="7" name="テキスト ボックス 6">
+            <a:extLst>
+              <a:ext uri="{FF2B5EF4-FFF2-40B4-BE49-F238E27FC236}">
+                <a16:creationId xmlns:a16="http://schemas.microsoft.com/office/drawing/2014/main" id="{2B7670BB-5F3C-8B47-980F-BC54C3ED3527}"/>
+              </a:ext>
+            </a:extLst>
+          </p:cNvPr>
+          <p:cNvSpPr txBox="1"/>
+          <p:nvPr/>
+        </p:nvSpPr>
+        <p:spPr>
+          <a:xfrm>
+            <a:off x="3099652" y="2700628"/>
+            <a:ext cx="8823249" cy="3170099"/>
+          </a:xfrm>
+          <a:prstGeom prst="rect">
+            <a:avLst/>
+          </a:prstGeom>
+          <a:noFill/>
+        </p:spPr>
+        <p:txBody>
+          <a:bodyPr wrap="none" rtlCol="0">
+            <a:spAutoFit/>
           </a:bodyPr>
           <a:lstStyle/>
           <a:p>
-            <a:pPr algn="ctr"/>
-            <a:r>
-              <a:rPr kumimoji="1" lang="ja-JP" altLang="en-US" sz="3600">
-                <a:solidFill>
-                  <a:schemeClr val="accent1">
-                    <a:lumMod val="50000"/>
-                  </a:schemeClr>
-                </a:solidFill>
-              </a:rPr>
-              <a:t>どこに書いたか分からない！</a:t>
-            </a:r>
-            <a:endParaRPr kumimoji="1" lang="en-US" altLang="ja-JP" sz="3600" dirty="0">
-              <a:solidFill>
-                <a:schemeClr val="accent1">
-                  <a:lumMod val="50000"/>
-                </a:schemeClr>
-              </a:solidFill>
-            </a:endParaRPr>
-          </a:p>
-          <a:p>
-            <a:pPr algn="ctr"/>
-            <a:r>
-              <a:rPr kumimoji="1" lang="en-US" altLang="ja-JP" sz="3600" dirty="0">
-                <a:solidFill>
-                  <a:schemeClr val="accent1">
-                    <a:lumMod val="50000"/>
-                  </a:schemeClr>
-                </a:solidFill>
-              </a:rPr>
+            <a:r>
+              <a:rPr kumimoji="1" lang="ja-JP" altLang="en-US" sz="4000"/>
+              <a:t>＊</a:t>
+            </a:r>
+            <a:r>
+              <a:rPr kumimoji="1" lang="en-US" altLang="ja-JP" sz="4000" dirty="0"/>
               <a:t>memo</a:t>
             </a:r>
             <a:r>
-              <a:rPr kumimoji="1" lang="ja-JP" altLang="en-US" sz="3600">
-                <a:solidFill>
-                  <a:schemeClr val="accent1">
-                    <a:lumMod val="50000"/>
-                  </a:schemeClr>
-                </a:solidFill>
-              </a:rPr>
-              <a:t>を失くしてしまった！</a:t>
+              <a:rPr kumimoji="1" lang="ja-JP" altLang="en-US" sz="4000"/>
+              <a:t>のどこに書いたか分からない</a:t>
+            </a:r>
+            <a:endParaRPr kumimoji="1" lang="en-US" altLang="ja-JP" sz="4000" dirty="0"/>
+          </a:p>
+          <a:p>
+            <a:endParaRPr kumimoji="1" lang="en-US" altLang="ja-JP" sz="4000" dirty="0"/>
+          </a:p>
+          <a:p>
+            <a:r>
+              <a:rPr kumimoji="1" lang="ja-JP" altLang="en-US" sz="4000"/>
+              <a:t>＊</a:t>
+            </a:r>
+            <a:r>
+              <a:rPr kumimoji="1" lang="en-US" altLang="ja-JP" sz="4000" dirty="0"/>
+              <a:t>memo</a:t>
+            </a:r>
+            <a:r>
+              <a:rPr kumimoji="1" lang="ja-JP" altLang="en-US" sz="4000"/>
+              <a:t>自体を失くしてしまった</a:t>
+            </a:r>
+            <a:endParaRPr kumimoji="1" lang="en-US" altLang="ja-JP" sz="4000" dirty="0"/>
+          </a:p>
+          <a:p>
+            <a:endParaRPr kumimoji="1" lang="en-US" altLang="ja-JP" sz="4000" dirty="0"/>
+          </a:p>
+          <a:p>
+            <a:r>
+              <a:rPr kumimoji="1" lang="ja-JP" altLang="en-US" sz="4000"/>
+              <a:t>　　　　　　　　　ことがよくある</a:t>
             </a:r>
           </a:p>
         </p:txBody>
@@ -4325,7 +4348,7 @@
         </p:blipFill>
         <p:spPr>
           <a:xfrm>
-            <a:off x="701601" y="3242400"/>
+            <a:off x="698202" y="3113623"/>
             <a:ext cx="719425" cy="719425"/>
           </a:xfrm>
           <a:prstGeom prst="rect">
@@ -4385,7 +4408,7 @@
         </p:blipFill>
         <p:spPr>
           <a:xfrm>
-            <a:off x="701601" y="2165492"/>
+            <a:off x="701601" y="2061103"/>
             <a:ext cx="719425" cy="719425"/>
           </a:xfrm>
           <a:prstGeom prst="rect">
@@ -4415,7 +4438,7 @@
         </p:blipFill>
         <p:spPr>
           <a:xfrm>
-            <a:off x="701601" y="4885569"/>
+            <a:off x="698202" y="4778949"/>
             <a:ext cx="719425" cy="719425"/>
           </a:xfrm>
           <a:prstGeom prst="rect">
@@ -4467,8 +4490,8 @@
         </p:nvSpPr>
         <p:spPr>
           <a:xfrm>
-            <a:off x="2992582" y="1007918"/>
-            <a:ext cx="4561609" cy="369332"/>
+            <a:off x="2190916" y="331513"/>
+            <a:ext cx="7867483" cy="769441"/>
           </a:xfrm>
           <a:prstGeom prst="rect">
             <a:avLst/>
@@ -4481,23 +4504,54 @@
           </a:bodyPr>
           <a:lstStyle/>
           <a:p>
-            <a:r>
-              <a:rPr kumimoji="1" lang="en-US" altLang="ja-JP" dirty="0" err="1"/>
+            <a:pPr algn="ctr"/>
+            <a:r>
+              <a:rPr kumimoji="1" lang="en-US" altLang="ja-JP" sz="4400" dirty="0" err="1"/>
               <a:t>my_help</a:t>
             </a:r>
             <a:r>
-              <a:rPr kumimoji="1" lang="ja-JP" altLang="en-US"/>
+              <a:rPr kumimoji="1" lang="ja-JP" altLang="en-US" sz="4400"/>
               <a:t>の振る舞い</a:t>
             </a:r>
           </a:p>
         </p:txBody>
       </p:sp>
-      <p:sp>
-        <p:nvSpPr>
-          <p:cNvPr id="3" name="テキスト ボックス 2">
-            <a:extLst>
-              <a:ext uri="{FF2B5EF4-FFF2-40B4-BE49-F238E27FC236}">
-                <a16:creationId xmlns:a16="http://schemas.microsoft.com/office/drawing/2014/main" id="{3642B0B8-2FD1-9D4B-86A7-4AB468148C9E}"/>
+      <p:pic>
+        <p:nvPicPr>
+          <p:cNvPr id="5" name="図 4">
+            <a:extLst>
+              <a:ext uri="{FF2B5EF4-FFF2-40B4-BE49-F238E27FC236}">
+                <a16:creationId xmlns:a16="http://schemas.microsoft.com/office/drawing/2014/main" id="{B6B5FFD5-F7F5-224E-A716-C6BBAB1EC885}"/>
+              </a:ext>
+            </a:extLst>
+          </p:cNvPr>
+          <p:cNvPicPr>
+            <a:picLocks noChangeAspect="1"/>
+          </p:cNvPicPr>
+          <p:nvPr/>
+        </p:nvPicPr>
+        <p:blipFill>
+          <a:blip r:embed="rId2"/>
+          <a:stretch>
+            <a:fillRect/>
+          </a:stretch>
+        </p:blipFill>
+        <p:spPr>
+          <a:xfrm>
+            <a:off x="-279234" y="1548863"/>
+            <a:ext cx="7368966" cy="5309137"/>
+          </a:xfrm>
+          <a:prstGeom prst="rect">
+            <a:avLst/>
+          </a:prstGeom>
+        </p:spPr>
+      </p:pic>
+      <p:sp>
+        <p:nvSpPr>
+          <p:cNvPr id="6" name="テキスト ボックス 5">
+            <a:extLst>
+              <a:ext uri="{FF2B5EF4-FFF2-40B4-BE49-F238E27FC236}">
+                <a16:creationId xmlns:a16="http://schemas.microsoft.com/office/drawing/2014/main" id="{4EE341B6-0457-C646-96F1-55F43A0B58F4}"/>
               </a:ext>
             </a:extLst>
           </p:cNvPr>
@@ -4506,8 +4560,8 @@
         </p:nvSpPr>
         <p:spPr>
           <a:xfrm>
-            <a:off x="2992582" y="2608118"/>
-            <a:ext cx="5299363" cy="369332"/>
+            <a:off x="6789107" y="2601050"/>
+            <a:ext cx="4977008" cy="2862322"/>
           </a:xfrm>
           <a:prstGeom prst="rect">
             <a:avLst/>
@@ -4521,10 +4575,46 @@
           <a:lstStyle/>
           <a:p>
             <a:r>
-              <a:rPr kumimoji="1" lang="ja-JP" altLang="en-US"/>
-              <a:t>スクショ．</a:t>
-            </a:r>
-            <a:endParaRPr kumimoji="1" lang="en-US" altLang="ja-JP" dirty="0"/>
+              <a:rPr kumimoji="1" lang="en-US" altLang="ja-JP" sz="3600" dirty="0"/>
+              <a:t>&gt;</a:t>
+            </a:r>
+            <a:r>
+              <a:rPr kumimoji="1" lang="en-US" altLang="ja-JP" sz="3600" dirty="0" err="1"/>
+              <a:t>my_help</a:t>
+            </a:r>
+            <a:r>
+              <a:rPr kumimoji="1" lang="en-US" altLang="ja-JP" sz="3600" dirty="0"/>
+              <a:t> list emacs </a:t>
+            </a:r>
+          </a:p>
+          <a:p>
+            <a:endParaRPr kumimoji="1" lang="en-US" altLang="ja-JP" sz="3600" dirty="0"/>
+          </a:p>
+          <a:p>
+            <a:r>
+              <a:rPr kumimoji="1" lang="en-US" altLang="ja-JP" sz="3600" dirty="0"/>
+              <a:t>emacs</a:t>
+            </a:r>
+            <a:r>
+              <a:rPr kumimoji="1" lang="ja-JP" altLang="en-US" sz="3600"/>
+              <a:t>の</a:t>
+            </a:r>
+            <a:r>
+              <a:rPr kumimoji="1" lang="en-US" altLang="ja-JP" sz="3600" dirty="0"/>
+              <a:t>command</a:t>
+            </a:r>
+            <a:r>
+              <a:rPr kumimoji="1" lang="ja-JP" altLang="en-US" sz="3600"/>
+              <a:t>の</a:t>
+            </a:r>
+            <a:r>
+              <a:rPr kumimoji="1" lang="en-US" altLang="ja-JP" sz="3600" dirty="0"/>
+              <a:t>help</a:t>
+            </a:r>
+            <a:r>
+              <a:rPr kumimoji="1" lang="ja-JP" altLang="en-US" sz="3600"/>
+              <a:t>がリスト表示される．</a:t>
+            </a:r>
           </a:p>
         </p:txBody>
       </p:sp>
@@ -4542,6 +4632,186 @@
 </file>
 
 <file path=ppt/slides/slide6.xml><?xml version="1.0" encoding="utf-8"?>
+<p:sld xmlns:a="http://schemas.openxmlformats.org/drawingml/2006/main" xmlns:r="http://schemas.openxmlformats.org/officeDocument/2006/relationships" xmlns:p="http://schemas.openxmlformats.org/presentationml/2006/main">
+  <p:cSld>
+    <p:spTree>
+      <p:nvGrpSpPr>
+        <p:cNvPr id="1" name=""/>
+        <p:cNvGrpSpPr/>
+        <p:nvPr/>
+      </p:nvGrpSpPr>
+      <p:grpSpPr>
+        <a:xfrm>
+          <a:off x="0" y="0"/>
+          <a:ext cx="0" cy="0"/>
+          <a:chOff x="0" y="0"/>
+          <a:chExt cx="0" cy="0"/>
+        </a:xfrm>
+      </p:grpSpPr>
+      <p:sp>
+        <p:nvSpPr>
+          <p:cNvPr id="2" name="テキスト ボックス 1">
+            <a:extLst>
+              <a:ext uri="{FF2B5EF4-FFF2-40B4-BE49-F238E27FC236}">
+                <a16:creationId xmlns:a16="http://schemas.microsoft.com/office/drawing/2014/main" id="{2304BA78-B549-BD40-8EB3-F19E35CDE63A}"/>
+              </a:ext>
+            </a:extLst>
+          </p:cNvPr>
+          <p:cNvSpPr txBox="1"/>
+          <p:nvPr/>
+        </p:nvSpPr>
+        <p:spPr>
+          <a:xfrm>
+            <a:off x="2190916" y="331513"/>
+            <a:ext cx="7867483" cy="769441"/>
+          </a:xfrm>
+          <a:prstGeom prst="rect">
+            <a:avLst/>
+          </a:prstGeom>
+          <a:noFill/>
+        </p:spPr>
+        <p:txBody>
+          <a:bodyPr wrap="square" rtlCol="0">
+            <a:spAutoFit/>
+          </a:bodyPr>
+          <a:lstStyle/>
+          <a:p>
+            <a:pPr algn="ctr"/>
+            <a:r>
+              <a:rPr kumimoji="1" lang="en-US" altLang="ja-JP" sz="4400" dirty="0" err="1"/>
+              <a:t>my_help</a:t>
+            </a:r>
+            <a:r>
+              <a:rPr kumimoji="1" lang="ja-JP" altLang="en-US" sz="4400"/>
+              <a:t>の振る舞い</a:t>
+            </a:r>
+          </a:p>
+        </p:txBody>
+      </p:sp>
+      <p:sp>
+        <p:nvSpPr>
+          <p:cNvPr id="6" name="テキスト ボックス 5">
+            <a:extLst>
+              <a:ext uri="{FF2B5EF4-FFF2-40B4-BE49-F238E27FC236}">
+                <a16:creationId xmlns:a16="http://schemas.microsoft.com/office/drawing/2014/main" id="{4EE341B6-0457-C646-96F1-55F43A0B58F4}"/>
+              </a:ext>
+            </a:extLst>
+          </p:cNvPr>
+          <p:cNvSpPr txBox="1"/>
+          <p:nvPr/>
+        </p:nvSpPr>
+        <p:spPr>
+          <a:xfrm>
+            <a:off x="6726476" y="2595480"/>
+            <a:ext cx="5465524" cy="2862322"/>
+          </a:xfrm>
+          <a:prstGeom prst="rect">
+            <a:avLst/>
+          </a:prstGeom>
+          <a:noFill/>
+        </p:spPr>
+        <p:txBody>
+          <a:bodyPr wrap="square" rtlCol="0">
+            <a:spAutoFit/>
+          </a:bodyPr>
+          <a:lstStyle/>
+          <a:p>
+            <a:r>
+              <a:rPr kumimoji="1" lang="en-US" altLang="ja-JP" sz="3600" dirty="0"/>
+              <a:t>&gt;</a:t>
+            </a:r>
+            <a:r>
+              <a:rPr kumimoji="1" lang="en-US" altLang="ja-JP" sz="3600" dirty="0" err="1"/>
+              <a:t>my_help</a:t>
+            </a:r>
+            <a:r>
+              <a:rPr kumimoji="1" lang="en-US" altLang="ja-JP" sz="3600" dirty="0"/>
+              <a:t> list emacs</a:t>
+            </a:r>
+            <a:r>
+              <a:rPr kumimoji="1" lang="ja-JP" altLang="en-US" sz="3600"/>
+              <a:t> </a:t>
+            </a:r>
+            <a:r>
+              <a:rPr kumimoji="1" lang="en-US" altLang="ja-JP" sz="3600" dirty="0"/>
+              <a:t>-w </a:t>
+            </a:r>
+          </a:p>
+          <a:p>
+            <a:endParaRPr kumimoji="1" lang="en-US" altLang="ja-JP" sz="3600" dirty="0"/>
+          </a:p>
+          <a:p>
+            <a:r>
+              <a:rPr kumimoji="1" lang="en-US" altLang="ja-JP" sz="3600" dirty="0"/>
+              <a:t>emacs</a:t>
+            </a:r>
+            <a:r>
+              <a:rPr kumimoji="1" lang="ja-JP" altLang="en-US" sz="3600"/>
+              <a:t>の</a:t>
+            </a:r>
+            <a:r>
+              <a:rPr kumimoji="1" lang="en-US" altLang="ja-JP" sz="3600" dirty="0"/>
+              <a:t>window</a:t>
+            </a:r>
+            <a:r>
+              <a:rPr kumimoji="1" lang="ja-JP" altLang="en-US" sz="3600"/>
+              <a:t>についての</a:t>
+            </a:r>
+            <a:r>
+              <a:rPr kumimoji="1" lang="en-US" altLang="ja-JP" sz="3600" dirty="0"/>
+              <a:t>help</a:t>
+            </a:r>
+            <a:r>
+              <a:rPr kumimoji="1" lang="ja-JP" altLang="en-US" sz="3600"/>
+              <a:t>がリスト表示される．</a:t>
+            </a:r>
+          </a:p>
+        </p:txBody>
+      </p:sp>
+      <p:pic>
+        <p:nvPicPr>
+          <p:cNvPr id="4" name="図 3">
+            <a:extLst>
+              <a:ext uri="{FF2B5EF4-FFF2-40B4-BE49-F238E27FC236}">
+                <a16:creationId xmlns:a16="http://schemas.microsoft.com/office/drawing/2014/main" id="{91A85033-A10D-B04D-9086-AE64F029B544}"/>
+              </a:ext>
+            </a:extLst>
+          </p:cNvPr>
+          <p:cNvPicPr>
+            <a:picLocks noChangeAspect="1"/>
+          </p:cNvPicPr>
+          <p:nvPr/>
+        </p:nvPicPr>
+        <p:blipFill>
+          <a:blip r:embed="rId2"/>
+          <a:stretch>
+            <a:fillRect/>
+          </a:stretch>
+        </p:blipFill>
+        <p:spPr>
+          <a:xfrm>
+            <a:off x="-204080" y="1443969"/>
+            <a:ext cx="7343915" cy="5291088"/>
+          </a:xfrm>
+          <a:prstGeom prst="rect">
+            <a:avLst/>
+          </a:prstGeom>
+        </p:spPr>
+      </p:pic>
+    </p:spTree>
+    <p:extLst>
+      <p:ext uri="{BB962C8B-B14F-4D97-AF65-F5344CB8AC3E}">
+        <p14:creationId xmlns:p14="http://schemas.microsoft.com/office/powerpoint/2010/main" val="2861018704"/>
+      </p:ext>
+    </p:extLst>
+  </p:cSld>
+  <p:clrMapOvr>
+    <a:masterClrMapping/>
+  </p:clrMapOvr>
+</p:sld>
+</file>
+
+<file path=ppt/slides/slide7.xml><?xml version="1.0" encoding="utf-8"?>
 <p:sld xmlns:a="http://schemas.openxmlformats.org/drawingml/2006/main" xmlns:r="http://schemas.openxmlformats.org/officeDocument/2006/relationships" xmlns:p="http://schemas.openxmlformats.org/presentationml/2006/main">
   <p:cSld>
     <p:spTree>
@@ -4776,9 +5046,9 @@
             <a:avLst/>
           </a:prstGeom>
           <a:solidFill>
-            <a:schemeClr val="accent2">
-              <a:lumMod val="40000"/>
-              <a:lumOff val="60000"/>
+            <a:schemeClr val="accent4">
+              <a:lumMod val="60000"/>
+              <a:lumOff val="40000"/>
             </a:schemeClr>
           </a:solidFill>
         </p:spPr>
@@ -4887,7 +5157,7 @@
 </p:sld>
 </file>
 
-<file path=ppt/slides/slide7.xml><?xml version="1.0" encoding="utf-8"?>
+<file path=ppt/slides/slide8.xml><?xml version="1.0" encoding="utf-8"?>
 <p:sld xmlns:a="http://schemas.openxmlformats.org/drawingml/2006/main" xmlns:r="http://schemas.openxmlformats.org/officeDocument/2006/relationships" xmlns:p="http://schemas.openxmlformats.org/presentationml/2006/main">
   <p:cSld>
     <p:spTree>
@@ -4954,7 +5224,7 @@
         </p:nvSpPr>
         <p:spPr>
           <a:xfrm>
-            <a:off x="893618" y="2931443"/>
+            <a:off x="1732861" y="3012322"/>
             <a:ext cx="6598228" cy="707886"/>
           </a:xfrm>
           <a:prstGeom prst="rect">
@@ -4970,14 +5240,6 @@
           <a:p>
             <a:r>
               <a:rPr kumimoji="1" lang="en-US" altLang="ja-JP" sz="4000" dirty="0"/>
-              <a:t>1.</a:t>
-            </a:r>
-            <a:r>
-              <a:rPr kumimoji="1" lang="ja-JP" altLang="en-US" sz="4000"/>
-              <a:t>  </a:t>
-            </a:r>
-            <a:r>
-              <a:rPr kumimoji="1" lang="en-US" altLang="ja-JP" sz="4000" dirty="0"/>
               <a:t>git</a:t>
             </a:r>
             <a:r>
@@ -5006,7 +5268,7 @@
         </p:nvSpPr>
         <p:spPr>
           <a:xfrm>
-            <a:off x="893618" y="4095069"/>
+            <a:off x="1732861" y="4095068"/>
             <a:ext cx="5878243" cy="707886"/>
           </a:xfrm>
           <a:prstGeom prst="rect">
@@ -5022,14 +5284,6 @@
           <a:p>
             <a:r>
               <a:rPr kumimoji="1" lang="en-US" altLang="ja-JP" sz="4000" dirty="0"/>
-              <a:t>2. </a:t>
-            </a:r>
-            <a:r>
-              <a:rPr kumimoji="1" lang="ja-JP" altLang="en-US" sz="4000"/>
-              <a:t> </a:t>
-            </a:r>
-            <a:r>
-              <a:rPr kumimoji="1" lang="en-US" altLang="ja-JP" sz="4000" dirty="0"/>
               <a:t>Web</a:t>
             </a:r>
             <a:r>
@@ -5053,7 +5307,7 @@
         </p:nvSpPr>
         <p:spPr>
           <a:xfrm>
-            <a:off x="893618" y="5258695"/>
+            <a:off x="1732861" y="5177814"/>
             <a:ext cx="7654034" cy="707886"/>
           </a:xfrm>
           <a:prstGeom prst="rect">
@@ -5069,7 +5323,7 @@
           <a:p>
             <a:r>
               <a:rPr kumimoji="1" lang="en-US" altLang="ja-JP" sz="4000" dirty="0"/>
-              <a:t>3.  Point</a:t>
+              <a:t>Point</a:t>
             </a:r>
             <a:r>
               <a:rPr kumimoji="1" lang="ja-JP" altLang="en-US" sz="4000"/>
@@ -5129,6 +5383,171 @@
               <a:rPr kumimoji="1" lang="ja-JP" altLang="en-US" sz="3600"/>
               <a:t>点の機能を取り入れる．</a:t>
             </a:r>
+          </a:p>
+        </p:txBody>
+      </p:sp>
+      <p:sp>
+        <p:nvSpPr>
+          <p:cNvPr id="9" name="雲 8">
+            <a:extLst>
+              <a:ext uri="{FF2B5EF4-FFF2-40B4-BE49-F238E27FC236}">
+                <a16:creationId xmlns:a16="http://schemas.microsoft.com/office/drawing/2014/main" id="{3B0152BD-3B19-0844-8384-39B3F1B64CB3}"/>
+              </a:ext>
+            </a:extLst>
+          </p:cNvPr>
+          <p:cNvSpPr/>
+          <p:nvPr/>
+        </p:nvSpPr>
+        <p:spPr>
+          <a:xfrm>
+            <a:off x="640061" y="3005994"/>
+            <a:ext cx="902525" cy="676893"/>
+          </a:xfrm>
+          <a:prstGeom prst="cloud">
+            <a:avLst/>
+          </a:prstGeom>
+          <a:solidFill>
+            <a:schemeClr val="accent4"/>
+          </a:solidFill>
+          <a:ln>
+            <a:noFill/>
+          </a:ln>
+          <a:effectLst>
+            <a:softEdge rad="50800"/>
+          </a:effectLst>
+        </p:spPr>
+        <p:style>
+          <a:lnRef idx="2">
+            <a:schemeClr val="accent1">
+              <a:shade val="50000"/>
+            </a:schemeClr>
+          </a:lnRef>
+          <a:fillRef idx="1">
+            <a:schemeClr val="accent1"/>
+          </a:fillRef>
+          <a:effectRef idx="0">
+            <a:schemeClr val="accent1"/>
+          </a:effectRef>
+          <a:fontRef idx="minor">
+            <a:schemeClr val="lt1"/>
+          </a:fontRef>
+        </p:style>
+        <p:txBody>
+          <a:bodyPr rtlCol="0" anchor="ctr"/>
+          <a:lstStyle/>
+          <a:p>
+            <a:pPr algn="ctr"/>
+            <a:endParaRPr kumimoji="1" lang="ja-JP" altLang="en-US"/>
+          </a:p>
+        </p:txBody>
+      </p:sp>
+      <p:sp>
+        <p:nvSpPr>
+          <p:cNvPr id="10" name="雲 9">
+            <a:extLst>
+              <a:ext uri="{FF2B5EF4-FFF2-40B4-BE49-F238E27FC236}">
+                <a16:creationId xmlns:a16="http://schemas.microsoft.com/office/drawing/2014/main" id="{A0776A33-803F-ED47-BD01-8DCDFE579EA9}"/>
+              </a:ext>
+            </a:extLst>
+          </p:cNvPr>
+          <p:cNvSpPr/>
+          <p:nvPr/>
+        </p:nvSpPr>
+        <p:spPr>
+          <a:xfrm>
+            <a:off x="622851" y="4110564"/>
+            <a:ext cx="902525" cy="676893"/>
+          </a:xfrm>
+          <a:prstGeom prst="cloud">
+            <a:avLst/>
+          </a:prstGeom>
+          <a:solidFill>
+            <a:schemeClr val="accent4"/>
+          </a:solidFill>
+          <a:ln>
+            <a:noFill/>
+          </a:ln>
+          <a:effectLst>
+            <a:softEdge rad="50800"/>
+          </a:effectLst>
+        </p:spPr>
+        <p:style>
+          <a:lnRef idx="2">
+            <a:schemeClr val="accent1">
+              <a:shade val="50000"/>
+            </a:schemeClr>
+          </a:lnRef>
+          <a:fillRef idx="1">
+            <a:schemeClr val="accent1"/>
+          </a:fillRef>
+          <a:effectRef idx="0">
+            <a:schemeClr val="accent1"/>
+          </a:effectRef>
+          <a:fontRef idx="minor">
+            <a:schemeClr val="lt1"/>
+          </a:fontRef>
+        </p:style>
+        <p:txBody>
+          <a:bodyPr rtlCol="0" anchor="ctr"/>
+          <a:lstStyle/>
+          <a:p>
+            <a:pPr algn="ctr"/>
+            <a:endParaRPr kumimoji="1" lang="ja-JP" altLang="en-US"/>
+          </a:p>
+        </p:txBody>
+      </p:sp>
+      <p:sp>
+        <p:nvSpPr>
+          <p:cNvPr id="11" name="雲 10">
+            <a:extLst>
+              <a:ext uri="{FF2B5EF4-FFF2-40B4-BE49-F238E27FC236}">
+                <a16:creationId xmlns:a16="http://schemas.microsoft.com/office/drawing/2014/main" id="{4ECB4129-7048-4E4A-983E-01383A891FDC}"/>
+              </a:ext>
+            </a:extLst>
+          </p:cNvPr>
+          <p:cNvSpPr/>
+          <p:nvPr/>
+        </p:nvSpPr>
+        <p:spPr>
+          <a:xfrm>
+            <a:off x="622852" y="5208807"/>
+            <a:ext cx="902525" cy="676893"/>
+          </a:xfrm>
+          <a:prstGeom prst="cloud">
+            <a:avLst/>
+          </a:prstGeom>
+          <a:solidFill>
+            <a:schemeClr val="accent4"/>
+          </a:solidFill>
+          <a:ln>
+            <a:noFill/>
+          </a:ln>
+          <a:effectLst>
+            <a:softEdge rad="50800"/>
+          </a:effectLst>
+        </p:spPr>
+        <p:style>
+          <a:lnRef idx="2">
+            <a:schemeClr val="accent1">
+              <a:shade val="50000"/>
+            </a:schemeClr>
+          </a:lnRef>
+          <a:fillRef idx="1">
+            <a:schemeClr val="accent1"/>
+          </a:fillRef>
+          <a:effectRef idx="0">
+            <a:schemeClr val="accent1"/>
+          </a:effectRef>
+          <a:fontRef idx="minor">
+            <a:schemeClr val="lt1"/>
+          </a:fontRef>
+        </p:style>
+        <p:txBody>
+          <a:bodyPr rtlCol="0" anchor="ctr"/>
+          <a:lstStyle/>
+          <a:p>
+            <a:pPr algn="ctr"/>
+            <a:endParaRPr kumimoji="1" lang="ja-JP" altLang="en-US"/>
           </a:p>
         </p:txBody>
       </p:sp>

</xml_diff>

<commit_message>
make some change in mid_presen.pptx
</commit_message>
<xml_diff>
--- a/docs/tomoko/mid_presen.pptx
+++ b/docs/tomoko/mid_presen.pptx
@@ -4,15 +4,20 @@
   <p:sldMasterIdLst>
     <p:sldMasterId id="2147483975" r:id="rId1"/>
   </p:sldMasterIdLst>
+  <p:notesMasterIdLst>
+    <p:notesMasterId r:id="rId12"/>
+  </p:notesMasterIdLst>
   <p:sldIdLst>
     <p:sldId id="256" r:id="rId2"/>
     <p:sldId id="262" r:id="rId3"/>
     <p:sldId id="257" r:id="rId4"/>
     <p:sldId id="261" r:id="rId5"/>
-    <p:sldId id="260" r:id="rId6"/>
-    <p:sldId id="264" r:id="rId7"/>
-    <p:sldId id="263" r:id="rId8"/>
-    <p:sldId id="258" r:id="rId9"/>
+    <p:sldId id="266" r:id="rId6"/>
+    <p:sldId id="260" r:id="rId7"/>
+    <p:sldId id="264" r:id="rId8"/>
+    <p:sldId id="265" r:id="rId9"/>
+    <p:sldId id="263" r:id="rId10"/>
+    <p:sldId id="258" r:id="rId11"/>
   </p:sldIdLst>
   <p:sldSz cx="12192000" cy="6858000"/>
   <p:notesSz cx="6858000" cy="9144000"/>
@@ -119,6 +124,1096 @@
 </p:presentation>
 </file>
 
+<file path=ppt/notesMasters/notesMaster1.xml><?xml version="1.0" encoding="utf-8"?>
+<p:notesMaster xmlns:a="http://schemas.openxmlformats.org/drawingml/2006/main" xmlns:r="http://schemas.openxmlformats.org/officeDocument/2006/relationships" xmlns:p="http://schemas.openxmlformats.org/presentationml/2006/main">
+  <p:cSld>
+    <p:bg>
+      <p:bgRef idx="1001">
+        <a:schemeClr val="bg1"/>
+      </p:bgRef>
+    </p:bg>
+    <p:spTree>
+      <p:nvGrpSpPr>
+        <p:cNvPr id="1" name=""/>
+        <p:cNvGrpSpPr/>
+        <p:nvPr/>
+      </p:nvGrpSpPr>
+      <p:grpSpPr>
+        <a:xfrm>
+          <a:off x="0" y="0"/>
+          <a:ext cx="0" cy="0"/>
+          <a:chOff x="0" y="0"/>
+          <a:chExt cx="0" cy="0"/>
+        </a:xfrm>
+      </p:grpSpPr>
+      <p:sp>
+        <p:nvSpPr>
+          <p:cNvPr id="2" name="ヘッダー プレースホルダー 1"/>
+          <p:cNvSpPr>
+            <a:spLocks noGrp="1"/>
+          </p:cNvSpPr>
+          <p:nvPr>
+            <p:ph type="hdr" sz="quarter"/>
+          </p:nvPr>
+        </p:nvSpPr>
+        <p:spPr>
+          <a:xfrm>
+            <a:off x="0" y="0"/>
+            <a:ext cx="2971800" cy="458788"/>
+          </a:xfrm>
+          <a:prstGeom prst="rect">
+            <a:avLst/>
+          </a:prstGeom>
+        </p:spPr>
+        <p:txBody>
+          <a:bodyPr vert="horz" lIns="91440" tIns="45720" rIns="91440" bIns="45720" rtlCol="0"/>
+          <a:lstStyle>
+            <a:lvl1pPr algn="l">
+              <a:defRPr sz="1200"/>
+            </a:lvl1pPr>
+          </a:lstStyle>
+          <a:p>
+            <a:endParaRPr kumimoji="1" lang="ja-JP" altLang="en-US"/>
+          </a:p>
+        </p:txBody>
+      </p:sp>
+      <p:sp>
+        <p:nvSpPr>
+          <p:cNvPr id="3" name="日付プレースホルダー 2"/>
+          <p:cNvSpPr>
+            <a:spLocks noGrp="1"/>
+          </p:cNvSpPr>
+          <p:nvPr>
+            <p:ph type="dt" idx="1"/>
+          </p:nvPr>
+        </p:nvSpPr>
+        <p:spPr>
+          <a:xfrm>
+            <a:off x="3884613" y="0"/>
+            <a:ext cx="2971800" cy="458788"/>
+          </a:xfrm>
+          <a:prstGeom prst="rect">
+            <a:avLst/>
+          </a:prstGeom>
+        </p:spPr>
+        <p:txBody>
+          <a:bodyPr vert="horz" lIns="91440" tIns="45720" rIns="91440" bIns="45720" rtlCol="0"/>
+          <a:lstStyle>
+            <a:lvl1pPr algn="r">
+              <a:defRPr sz="1200"/>
+            </a:lvl1pPr>
+          </a:lstStyle>
+          <a:p>
+            <a:fld id="{BCF8B642-7FC1-E947-9552-A4615B252889}" type="datetimeFigureOut">
+              <a:rPr kumimoji="1" lang="ja-JP" altLang="en-US" smtClean="0"/>
+              <a:t>2018/9/18</a:t>
+            </a:fld>
+            <a:endParaRPr kumimoji="1" lang="ja-JP" altLang="en-US"/>
+          </a:p>
+        </p:txBody>
+      </p:sp>
+      <p:sp>
+        <p:nvSpPr>
+          <p:cNvPr id="4" name="スライド イメージ プレースホルダー 3"/>
+          <p:cNvSpPr>
+            <a:spLocks noGrp="1" noRot="1" noChangeAspect="1"/>
+          </p:cNvSpPr>
+          <p:nvPr>
+            <p:ph type="sldImg" idx="2"/>
+          </p:nvPr>
+        </p:nvSpPr>
+        <p:spPr>
+          <a:xfrm>
+            <a:off x="685800" y="1143000"/>
+            <a:ext cx="5486400" cy="3086100"/>
+          </a:xfrm>
+          <a:prstGeom prst="rect">
+            <a:avLst/>
+          </a:prstGeom>
+          <a:noFill/>
+          <a:ln w="12700">
+            <a:solidFill>
+              <a:prstClr val="black"/>
+            </a:solidFill>
+          </a:ln>
+        </p:spPr>
+        <p:txBody>
+          <a:bodyPr vert="horz" lIns="91440" tIns="45720" rIns="91440" bIns="45720" rtlCol="0" anchor="ctr"/>
+          <a:lstStyle/>
+          <a:p>
+            <a:endParaRPr lang="ja-JP" altLang="en-US"/>
+          </a:p>
+        </p:txBody>
+      </p:sp>
+      <p:sp>
+        <p:nvSpPr>
+          <p:cNvPr id="5" name="ノート プレースホルダー 4"/>
+          <p:cNvSpPr>
+            <a:spLocks noGrp="1"/>
+          </p:cNvSpPr>
+          <p:nvPr>
+            <p:ph type="body" sz="quarter" idx="3"/>
+          </p:nvPr>
+        </p:nvSpPr>
+        <p:spPr>
+          <a:xfrm>
+            <a:off x="685800" y="4400550"/>
+            <a:ext cx="5486400" cy="3600450"/>
+          </a:xfrm>
+          <a:prstGeom prst="rect">
+            <a:avLst/>
+          </a:prstGeom>
+        </p:spPr>
+        <p:txBody>
+          <a:bodyPr vert="horz" lIns="91440" tIns="45720" rIns="91440" bIns="45720" rtlCol="0"/>
+          <a:lstStyle/>
+          <a:p>
+            <a:r>
+              <a:rPr kumimoji="1" lang="ja-JP" altLang="en-US"/>
+              <a:t>マスター テキストの書式設定
+第 </a:t>
+            </a:r>
+            <a:r>
+              <a:rPr kumimoji="1" lang="en-US" altLang="ja-JP"/>
+              <a:t>2 </a:t>
+            </a:r>
+            <a:r>
+              <a:rPr kumimoji="1" lang="ja-JP" altLang="en-US"/>
+              <a:t>レベル
+第 </a:t>
+            </a:r>
+            <a:r>
+              <a:rPr kumimoji="1" lang="en-US" altLang="ja-JP"/>
+              <a:t>3 </a:t>
+            </a:r>
+            <a:r>
+              <a:rPr kumimoji="1" lang="ja-JP" altLang="en-US"/>
+              <a:t>レベル
+第 </a:t>
+            </a:r>
+            <a:r>
+              <a:rPr kumimoji="1" lang="en-US" altLang="ja-JP"/>
+              <a:t>4 </a:t>
+            </a:r>
+            <a:r>
+              <a:rPr kumimoji="1" lang="ja-JP" altLang="en-US"/>
+              <a:t>レベル
+第 </a:t>
+            </a:r>
+            <a:r>
+              <a:rPr kumimoji="1" lang="en-US" altLang="ja-JP"/>
+              <a:t>5 </a:t>
+            </a:r>
+            <a:r>
+              <a:rPr kumimoji="1" lang="ja-JP" altLang="en-US"/>
+              <a:t>レベル</a:t>
+            </a:r>
+          </a:p>
+        </p:txBody>
+      </p:sp>
+      <p:sp>
+        <p:nvSpPr>
+          <p:cNvPr id="6" name="フッター プレースホルダー 5"/>
+          <p:cNvSpPr>
+            <a:spLocks noGrp="1"/>
+          </p:cNvSpPr>
+          <p:nvPr>
+            <p:ph type="ftr" sz="quarter" idx="4"/>
+          </p:nvPr>
+        </p:nvSpPr>
+        <p:spPr>
+          <a:xfrm>
+            <a:off x="0" y="8685213"/>
+            <a:ext cx="2971800" cy="458787"/>
+          </a:xfrm>
+          <a:prstGeom prst="rect">
+            <a:avLst/>
+          </a:prstGeom>
+        </p:spPr>
+        <p:txBody>
+          <a:bodyPr vert="horz" lIns="91440" tIns="45720" rIns="91440" bIns="45720" rtlCol="0" anchor="b"/>
+          <a:lstStyle>
+            <a:lvl1pPr algn="l">
+              <a:defRPr sz="1200"/>
+            </a:lvl1pPr>
+          </a:lstStyle>
+          <a:p>
+            <a:endParaRPr kumimoji="1" lang="ja-JP" altLang="en-US"/>
+          </a:p>
+        </p:txBody>
+      </p:sp>
+      <p:sp>
+        <p:nvSpPr>
+          <p:cNvPr id="7" name="スライド番号プレースホルダー 6"/>
+          <p:cNvSpPr>
+            <a:spLocks noGrp="1"/>
+          </p:cNvSpPr>
+          <p:nvPr>
+            <p:ph type="sldNum" sz="quarter" idx="5"/>
+          </p:nvPr>
+        </p:nvSpPr>
+        <p:spPr>
+          <a:xfrm>
+            <a:off x="3884613" y="8685213"/>
+            <a:ext cx="2971800" cy="458787"/>
+          </a:xfrm>
+          <a:prstGeom prst="rect">
+            <a:avLst/>
+          </a:prstGeom>
+        </p:spPr>
+        <p:txBody>
+          <a:bodyPr vert="horz" lIns="91440" tIns="45720" rIns="91440" bIns="45720" rtlCol="0" anchor="b"/>
+          <a:lstStyle>
+            <a:lvl1pPr algn="r">
+              <a:defRPr sz="1200"/>
+            </a:lvl1pPr>
+          </a:lstStyle>
+          <a:p>
+            <a:fld id="{1ADAC0CF-44CB-154A-BAFE-E085248CAD66}" type="slidenum">
+              <a:rPr kumimoji="1" lang="ja-JP" altLang="en-US" smtClean="0"/>
+              <a:t>‹#›</a:t>
+            </a:fld>
+            <a:endParaRPr kumimoji="1" lang="ja-JP" altLang="en-US"/>
+          </a:p>
+        </p:txBody>
+      </p:sp>
+    </p:spTree>
+    <p:extLst>
+      <p:ext uri="{BB962C8B-B14F-4D97-AF65-F5344CB8AC3E}">
+        <p14:creationId xmlns:p14="http://schemas.microsoft.com/office/powerpoint/2010/main" val="1654079846"/>
+      </p:ext>
+    </p:extLst>
+  </p:cSld>
+  <p:clrMap bg1="lt1" tx1="dk1" bg2="lt2" tx2="dk2" accent1="accent1" accent2="accent2" accent3="accent3" accent4="accent4" accent5="accent5" accent6="accent6" hlink="hlink" folHlink="folHlink"/>
+  <p:notesStyle>
+    <a:lvl1pPr marL="0" algn="l" defTabSz="914400" rtl="0" eaLnBrk="1" latinLnBrk="0" hangingPunct="1">
+      <a:defRPr kumimoji="1" sz="1200" kern="1200">
+        <a:solidFill>
+          <a:schemeClr val="tx1"/>
+        </a:solidFill>
+        <a:latin typeface="+mn-lt"/>
+        <a:ea typeface="+mn-ea"/>
+        <a:cs typeface="+mn-cs"/>
+      </a:defRPr>
+    </a:lvl1pPr>
+    <a:lvl2pPr marL="457200" algn="l" defTabSz="914400" rtl="0" eaLnBrk="1" latinLnBrk="0" hangingPunct="1">
+      <a:defRPr kumimoji="1" sz="1200" kern="1200">
+        <a:solidFill>
+          <a:schemeClr val="tx1"/>
+        </a:solidFill>
+        <a:latin typeface="+mn-lt"/>
+        <a:ea typeface="+mn-ea"/>
+        <a:cs typeface="+mn-cs"/>
+      </a:defRPr>
+    </a:lvl2pPr>
+    <a:lvl3pPr marL="914400" algn="l" defTabSz="914400" rtl="0" eaLnBrk="1" latinLnBrk="0" hangingPunct="1">
+      <a:defRPr kumimoji="1" sz="1200" kern="1200">
+        <a:solidFill>
+          <a:schemeClr val="tx1"/>
+        </a:solidFill>
+        <a:latin typeface="+mn-lt"/>
+        <a:ea typeface="+mn-ea"/>
+        <a:cs typeface="+mn-cs"/>
+      </a:defRPr>
+    </a:lvl3pPr>
+    <a:lvl4pPr marL="1371600" algn="l" defTabSz="914400" rtl="0" eaLnBrk="1" latinLnBrk="0" hangingPunct="1">
+      <a:defRPr kumimoji="1" sz="1200" kern="1200">
+        <a:solidFill>
+          <a:schemeClr val="tx1"/>
+        </a:solidFill>
+        <a:latin typeface="+mn-lt"/>
+        <a:ea typeface="+mn-ea"/>
+        <a:cs typeface="+mn-cs"/>
+      </a:defRPr>
+    </a:lvl4pPr>
+    <a:lvl5pPr marL="1828800" algn="l" defTabSz="914400" rtl="0" eaLnBrk="1" latinLnBrk="0" hangingPunct="1">
+      <a:defRPr kumimoji="1" sz="1200" kern="1200">
+        <a:solidFill>
+          <a:schemeClr val="tx1"/>
+        </a:solidFill>
+        <a:latin typeface="+mn-lt"/>
+        <a:ea typeface="+mn-ea"/>
+        <a:cs typeface="+mn-cs"/>
+      </a:defRPr>
+    </a:lvl5pPr>
+    <a:lvl6pPr marL="2286000" algn="l" defTabSz="914400" rtl="0" eaLnBrk="1" latinLnBrk="0" hangingPunct="1">
+      <a:defRPr kumimoji="1" sz="1200" kern="1200">
+        <a:solidFill>
+          <a:schemeClr val="tx1"/>
+        </a:solidFill>
+        <a:latin typeface="+mn-lt"/>
+        <a:ea typeface="+mn-ea"/>
+        <a:cs typeface="+mn-cs"/>
+      </a:defRPr>
+    </a:lvl6pPr>
+    <a:lvl7pPr marL="2743200" algn="l" defTabSz="914400" rtl="0" eaLnBrk="1" latinLnBrk="0" hangingPunct="1">
+      <a:defRPr kumimoji="1" sz="1200" kern="1200">
+        <a:solidFill>
+          <a:schemeClr val="tx1"/>
+        </a:solidFill>
+        <a:latin typeface="+mn-lt"/>
+        <a:ea typeface="+mn-ea"/>
+        <a:cs typeface="+mn-cs"/>
+      </a:defRPr>
+    </a:lvl7pPr>
+    <a:lvl8pPr marL="3200400" algn="l" defTabSz="914400" rtl="0" eaLnBrk="1" latinLnBrk="0" hangingPunct="1">
+      <a:defRPr kumimoji="1" sz="1200" kern="1200">
+        <a:solidFill>
+          <a:schemeClr val="tx1"/>
+        </a:solidFill>
+        <a:latin typeface="+mn-lt"/>
+        <a:ea typeface="+mn-ea"/>
+        <a:cs typeface="+mn-cs"/>
+      </a:defRPr>
+    </a:lvl8pPr>
+    <a:lvl9pPr marL="3657600" algn="l" defTabSz="914400" rtl="0" eaLnBrk="1" latinLnBrk="0" hangingPunct="1">
+      <a:defRPr kumimoji="1" sz="1200" kern="1200">
+        <a:solidFill>
+          <a:schemeClr val="tx1"/>
+        </a:solidFill>
+        <a:latin typeface="+mn-lt"/>
+        <a:ea typeface="+mn-ea"/>
+        <a:cs typeface="+mn-cs"/>
+      </a:defRPr>
+    </a:lvl9pPr>
+  </p:notesStyle>
+</p:notesMaster>
+</file>
+
+<file path=ppt/notesSlides/notesSlide1.xml><?xml version="1.0" encoding="utf-8"?>
+<p:notes xmlns:a="http://schemas.openxmlformats.org/drawingml/2006/main" xmlns:r="http://schemas.openxmlformats.org/officeDocument/2006/relationships" xmlns:p="http://schemas.openxmlformats.org/presentationml/2006/main">
+  <p:cSld>
+    <p:spTree>
+      <p:nvGrpSpPr>
+        <p:cNvPr id="1" name=""/>
+        <p:cNvGrpSpPr/>
+        <p:nvPr/>
+      </p:nvGrpSpPr>
+      <p:grpSpPr>
+        <a:xfrm>
+          <a:off x="0" y="0"/>
+          <a:ext cx="0" cy="0"/>
+          <a:chOff x="0" y="0"/>
+          <a:chExt cx="0" cy="0"/>
+        </a:xfrm>
+      </p:grpSpPr>
+      <p:sp>
+        <p:nvSpPr>
+          <p:cNvPr id="2" name="スライド イメージ プレースホルダー 1"/>
+          <p:cNvSpPr>
+            <a:spLocks noGrp="1" noRot="1" noChangeAspect="1"/>
+          </p:cNvSpPr>
+          <p:nvPr>
+            <p:ph type="sldImg"/>
+          </p:nvPr>
+        </p:nvSpPr>
+        <p:spPr/>
+      </p:sp>
+      <p:sp>
+        <p:nvSpPr>
+          <p:cNvPr id="3" name="ノート プレースホルダー 2"/>
+          <p:cNvSpPr>
+            <a:spLocks noGrp="1"/>
+          </p:cNvSpPr>
+          <p:nvPr>
+            <p:ph type="body" idx="1"/>
+          </p:nvPr>
+        </p:nvSpPr>
+        <p:spPr/>
+        <p:txBody>
+          <a:bodyPr/>
+          <a:lstStyle/>
+          <a:p>
+            <a:r>
+              <a:rPr kumimoji="1" lang="ja-JP" altLang="en-US"/>
+              <a:t>情報の山田です．</a:t>
+            </a:r>
+            <a:endParaRPr kumimoji="1" lang="en-US" altLang="ja-JP" dirty="0"/>
+          </a:p>
+          <a:p>
+            <a:r>
+              <a:rPr kumimoji="1" lang="en-US" altLang="ja-JP" dirty="0"/>
+              <a:t>Memo</a:t>
+            </a:r>
+            <a:r>
+              <a:rPr kumimoji="1" lang="ja-JP" altLang="en-US"/>
+              <a:t>ソフト</a:t>
+            </a:r>
+            <a:r>
+              <a:rPr kumimoji="1" lang="en-US" altLang="ja-JP" dirty="0" err="1"/>
+              <a:t>my_help</a:t>
+            </a:r>
+            <a:r>
+              <a:rPr kumimoji="1" lang="ja-JP" altLang="en-US"/>
+              <a:t>の</a:t>
+            </a:r>
+          </a:p>
+        </p:txBody>
+      </p:sp>
+      <p:sp>
+        <p:nvSpPr>
+          <p:cNvPr id="4" name="スライド番号プレースホルダー 3"/>
+          <p:cNvSpPr>
+            <a:spLocks noGrp="1"/>
+          </p:cNvSpPr>
+          <p:nvPr>
+            <p:ph type="sldNum" sz="quarter" idx="5"/>
+          </p:nvPr>
+        </p:nvSpPr>
+        <p:spPr/>
+        <p:txBody>
+          <a:bodyPr/>
+          <a:lstStyle/>
+          <a:p>
+            <a:fld id="{1ADAC0CF-44CB-154A-BAFE-E085248CAD66}" type="slidenum">
+              <a:rPr kumimoji="1" lang="ja-JP" altLang="en-US" smtClean="0"/>
+              <a:t>1</a:t>
+            </a:fld>
+            <a:endParaRPr kumimoji="1" lang="ja-JP" altLang="en-US"/>
+          </a:p>
+        </p:txBody>
+      </p:sp>
+    </p:spTree>
+    <p:extLst>
+      <p:ext uri="{BB962C8B-B14F-4D97-AF65-F5344CB8AC3E}">
+        <p14:creationId xmlns:p14="http://schemas.microsoft.com/office/powerpoint/2010/main" val="374065010"/>
+      </p:ext>
+    </p:extLst>
+  </p:cSld>
+  <p:clrMapOvr>
+    <a:masterClrMapping/>
+  </p:clrMapOvr>
+</p:notes>
+</file>
+
+<file path=ppt/notesSlides/notesSlide2.xml><?xml version="1.0" encoding="utf-8"?>
+<p:notes xmlns:a="http://schemas.openxmlformats.org/drawingml/2006/main" xmlns:r="http://schemas.openxmlformats.org/officeDocument/2006/relationships" xmlns:p="http://schemas.openxmlformats.org/presentationml/2006/main">
+  <p:cSld>
+    <p:spTree>
+      <p:nvGrpSpPr>
+        <p:cNvPr id="1" name=""/>
+        <p:cNvGrpSpPr/>
+        <p:nvPr/>
+      </p:nvGrpSpPr>
+      <p:grpSpPr>
+        <a:xfrm>
+          <a:off x="0" y="0"/>
+          <a:ext cx="0" cy="0"/>
+          <a:chOff x="0" y="0"/>
+          <a:chExt cx="0" cy="0"/>
+        </a:xfrm>
+      </p:grpSpPr>
+      <p:sp>
+        <p:nvSpPr>
+          <p:cNvPr id="2" name="スライド イメージ プレースホルダー 1"/>
+          <p:cNvSpPr>
+            <a:spLocks noGrp="1" noRot="1" noChangeAspect="1"/>
+          </p:cNvSpPr>
+          <p:nvPr>
+            <p:ph type="sldImg"/>
+          </p:nvPr>
+        </p:nvSpPr>
+        <p:spPr/>
+      </p:sp>
+      <p:sp>
+        <p:nvSpPr>
+          <p:cNvPr id="3" name="ノート プレースホルダー 2"/>
+          <p:cNvSpPr>
+            <a:spLocks noGrp="1"/>
+          </p:cNvSpPr>
+          <p:nvPr>
+            <p:ph type="body" idx="1"/>
+          </p:nvPr>
+        </p:nvSpPr>
+        <p:spPr/>
+        <p:txBody>
+          <a:bodyPr/>
+          <a:lstStyle/>
+          <a:p>
+            <a:endParaRPr kumimoji="1" lang="ja-JP" altLang="en-US"/>
+          </a:p>
+        </p:txBody>
+      </p:sp>
+      <p:sp>
+        <p:nvSpPr>
+          <p:cNvPr id="4" name="スライド番号プレースホルダー 3"/>
+          <p:cNvSpPr>
+            <a:spLocks noGrp="1"/>
+          </p:cNvSpPr>
+          <p:nvPr>
+            <p:ph type="sldNum" sz="quarter" idx="5"/>
+          </p:nvPr>
+        </p:nvSpPr>
+        <p:spPr/>
+        <p:txBody>
+          <a:bodyPr/>
+          <a:lstStyle/>
+          <a:p>
+            <a:fld id="{1ADAC0CF-44CB-154A-BAFE-E085248CAD66}" type="slidenum">
+              <a:rPr kumimoji="1" lang="ja-JP" altLang="en-US" smtClean="0"/>
+              <a:t>2</a:t>
+            </a:fld>
+            <a:endParaRPr kumimoji="1" lang="ja-JP" altLang="en-US"/>
+          </a:p>
+        </p:txBody>
+      </p:sp>
+    </p:spTree>
+    <p:extLst>
+      <p:ext uri="{BB962C8B-B14F-4D97-AF65-F5344CB8AC3E}">
+        <p14:creationId xmlns:p14="http://schemas.microsoft.com/office/powerpoint/2010/main" val="1152558002"/>
+      </p:ext>
+    </p:extLst>
+  </p:cSld>
+  <p:clrMapOvr>
+    <a:masterClrMapping/>
+  </p:clrMapOvr>
+</p:notes>
+</file>
+
+<file path=ppt/notesSlides/notesSlide3.xml><?xml version="1.0" encoding="utf-8"?>
+<p:notes xmlns:a="http://schemas.openxmlformats.org/drawingml/2006/main" xmlns:r="http://schemas.openxmlformats.org/officeDocument/2006/relationships" xmlns:p="http://schemas.openxmlformats.org/presentationml/2006/main">
+  <p:cSld>
+    <p:spTree>
+      <p:nvGrpSpPr>
+        <p:cNvPr id="1" name=""/>
+        <p:cNvGrpSpPr/>
+        <p:nvPr/>
+      </p:nvGrpSpPr>
+      <p:grpSpPr>
+        <a:xfrm>
+          <a:off x="0" y="0"/>
+          <a:ext cx="0" cy="0"/>
+          <a:chOff x="0" y="0"/>
+          <a:chExt cx="0" cy="0"/>
+        </a:xfrm>
+      </p:grpSpPr>
+      <p:sp>
+        <p:nvSpPr>
+          <p:cNvPr id="2" name="スライド イメージ プレースホルダー 1"/>
+          <p:cNvSpPr>
+            <a:spLocks noGrp="1" noRot="1" noChangeAspect="1"/>
+          </p:cNvSpPr>
+          <p:nvPr>
+            <p:ph type="sldImg"/>
+          </p:nvPr>
+        </p:nvSpPr>
+        <p:spPr/>
+      </p:sp>
+      <p:sp>
+        <p:nvSpPr>
+          <p:cNvPr id="3" name="ノート プレースホルダー 2"/>
+          <p:cNvSpPr>
+            <a:spLocks noGrp="1"/>
+          </p:cNvSpPr>
+          <p:nvPr>
+            <p:ph type="body" idx="1"/>
+          </p:nvPr>
+        </p:nvSpPr>
+        <p:spPr/>
+        <p:txBody>
+          <a:bodyPr/>
+          <a:lstStyle/>
+          <a:p>
+            <a:endParaRPr kumimoji="1" lang="ja-JP" altLang="en-US"/>
+          </a:p>
+        </p:txBody>
+      </p:sp>
+      <p:sp>
+        <p:nvSpPr>
+          <p:cNvPr id="4" name="スライド番号プレースホルダー 3"/>
+          <p:cNvSpPr>
+            <a:spLocks noGrp="1"/>
+          </p:cNvSpPr>
+          <p:nvPr>
+            <p:ph type="sldNum" sz="quarter" idx="5"/>
+          </p:nvPr>
+        </p:nvSpPr>
+        <p:spPr/>
+        <p:txBody>
+          <a:bodyPr/>
+          <a:lstStyle/>
+          <a:p>
+            <a:fld id="{1ADAC0CF-44CB-154A-BAFE-E085248CAD66}" type="slidenum">
+              <a:rPr kumimoji="1" lang="ja-JP" altLang="en-US" smtClean="0"/>
+              <a:t>3</a:t>
+            </a:fld>
+            <a:endParaRPr kumimoji="1" lang="ja-JP" altLang="en-US"/>
+          </a:p>
+        </p:txBody>
+      </p:sp>
+    </p:spTree>
+    <p:extLst>
+      <p:ext uri="{BB962C8B-B14F-4D97-AF65-F5344CB8AC3E}">
+        <p14:creationId xmlns:p14="http://schemas.microsoft.com/office/powerpoint/2010/main" val="3286507807"/>
+      </p:ext>
+    </p:extLst>
+  </p:cSld>
+  <p:clrMapOvr>
+    <a:masterClrMapping/>
+  </p:clrMapOvr>
+</p:notes>
+</file>
+
+<file path=ppt/notesSlides/notesSlide4.xml><?xml version="1.0" encoding="utf-8"?>
+<p:notes xmlns:a="http://schemas.openxmlformats.org/drawingml/2006/main" xmlns:r="http://schemas.openxmlformats.org/officeDocument/2006/relationships" xmlns:p="http://schemas.openxmlformats.org/presentationml/2006/main">
+  <p:cSld>
+    <p:spTree>
+      <p:nvGrpSpPr>
+        <p:cNvPr id="1" name=""/>
+        <p:cNvGrpSpPr/>
+        <p:nvPr/>
+      </p:nvGrpSpPr>
+      <p:grpSpPr>
+        <a:xfrm>
+          <a:off x="0" y="0"/>
+          <a:ext cx="0" cy="0"/>
+          <a:chOff x="0" y="0"/>
+          <a:chExt cx="0" cy="0"/>
+        </a:xfrm>
+      </p:grpSpPr>
+      <p:sp>
+        <p:nvSpPr>
+          <p:cNvPr id="2" name="スライド イメージ プレースホルダー 1"/>
+          <p:cNvSpPr>
+            <a:spLocks noGrp="1" noRot="1" noChangeAspect="1"/>
+          </p:cNvSpPr>
+          <p:nvPr>
+            <p:ph type="sldImg"/>
+          </p:nvPr>
+        </p:nvSpPr>
+        <p:spPr/>
+      </p:sp>
+      <p:sp>
+        <p:nvSpPr>
+          <p:cNvPr id="3" name="ノート プレースホルダー 2"/>
+          <p:cNvSpPr>
+            <a:spLocks noGrp="1"/>
+          </p:cNvSpPr>
+          <p:nvPr>
+            <p:ph type="body" idx="1"/>
+          </p:nvPr>
+        </p:nvSpPr>
+        <p:spPr/>
+        <p:txBody>
+          <a:bodyPr/>
+          <a:lstStyle/>
+          <a:p>
+            <a:r>
+              <a:rPr kumimoji="1" lang="ja-JP" altLang="en-US"/>
+              <a:t>同じディレクトリにいなくても追加，編集，削除ができます．</a:t>
+            </a:r>
+            <a:endParaRPr kumimoji="1" lang="en-US" altLang="ja-JP" dirty="0"/>
+          </a:p>
+          <a:p>
+            <a:endParaRPr kumimoji="1" lang="en-US" altLang="ja-JP" dirty="0"/>
+          </a:p>
+          <a:p>
+            <a:r>
+              <a:rPr kumimoji="1" lang="ja-JP" altLang="en-US"/>
+              <a:t>メモを残したファイルを探す手間が省ける．</a:t>
+            </a:r>
+          </a:p>
+        </p:txBody>
+      </p:sp>
+      <p:sp>
+        <p:nvSpPr>
+          <p:cNvPr id="4" name="スライド番号プレースホルダー 3"/>
+          <p:cNvSpPr>
+            <a:spLocks noGrp="1"/>
+          </p:cNvSpPr>
+          <p:nvPr>
+            <p:ph type="sldNum" sz="quarter" idx="5"/>
+          </p:nvPr>
+        </p:nvSpPr>
+        <p:spPr/>
+        <p:txBody>
+          <a:bodyPr/>
+          <a:lstStyle/>
+          <a:p>
+            <a:fld id="{1ADAC0CF-44CB-154A-BAFE-E085248CAD66}" type="slidenum">
+              <a:rPr kumimoji="1" lang="ja-JP" altLang="en-US" smtClean="0"/>
+              <a:t>4</a:t>
+            </a:fld>
+            <a:endParaRPr kumimoji="1" lang="ja-JP" altLang="en-US"/>
+          </a:p>
+        </p:txBody>
+      </p:sp>
+    </p:spTree>
+    <p:extLst>
+      <p:ext uri="{BB962C8B-B14F-4D97-AF65-F5344CB8AC3E}">
+        <p14:creationId xmlns:p14="http://schemas.microsoft.com/office/powerpoint/2010/main" val="2743863912"/>
+      </p:ext>
+    </p:extLst>
+  </p:cSld>
+  <p:clrMapOvr>
+    <a:masterClrMapping/>
+  </p:clrMapOvr>
+</p:notes>
+</file>
+
+<file path=ppt/notesSlides/notesSlide5.xml><?xml version="1.0" encoding="utf-8"?>
+<p:notes xmlns:a="http://schemas.openxmlformats.org/drawingml/2006/main" xmlns:r="http://schemas.openxmlformats.org/officeDocument/2006/relationships" xmlns:p="http://schemas.openxmlformats.org/presentationml/2006/main">
+  <p:cSld>
+    <p:spTree>
+      <p:nvGrpSpPr>
+        <p:cNvPr id="1" name=""/>
+        <p:cNvGrpSpPr/>
+        <p:nvPr/>
+      </p:nvGrpSpPr>
+      <p:grpSpPr>
+        <a:xfrm>
+          <a:off x="0" y="0"/>
+          <a:ext cx="0" cy="0"/>
+          <a:chOff x="0" y="0"/>
+          <a:chExt cx="0" cy="0"/>
+        </a:xfrm>
+      </p:grpSpPr>
+      <p:sp>
+        <p:nvSpPr>
+          <p:cNvPr id="2" name="スライド イメージ プレースホルダー 1"/>
+          <p:cNvSpPr>
+            <a:spLocks noGrp="1" noRot="1" noChangeAspect="1"/>
+          </p:cNvSpPr>
+          <p:nvPr>
+            <p:ph type="sldImg"/>
+          </p:nvPr>
+        </p:nvSpPr>
+        <p:spPr/>
+      </p:sp>
+      <p:sp>
+        <p:nvSpPr>
+          <p:cNvPr id="3" name="ノート プレースホルダー 2"/>
+          <p:cNvSpPr>
+            <a:spLocks noGrp="1"/>
+          </p:cNvSpPr>
+          <p:nvPr>
+            <p:ph type="body" idx="1"/>
+          </p:nvPr>
+        </p:nvSpPr>
+        <p:spPr/>
+        <p:txBody>
+          <a:bodyPr/>
+          <a:lstStyle/>
+          <a:p>
+            <a:r>
+              <a:rPr kumimoji="1" lang="ja-JP" altLang="en-US"/>
+              <a:t>同じディレクトリにいなくても追加，編集，削除ができます．</a:t>
+            </a:r>
+            <a:endParaRPr kumimoji="1" lang="en-US" altLang="ja-JP" dirty="0"/>
+          </a:p>
+          <a:p>
+            <a:endParaRPr kumimoji="1" lang="en-US" altLang="ja-JP" dirty="0"/>
+          </a:p>
+          <a:p>
+            <a:r>
+              <a:rPr kumimoji="1" lang="ja-JP" altLang="en-US"/>
+              <a:t>メモを残したファイルを探す手間が省ける．</a:t>
+            </a:r>
+          </a:p>
+        </p:txBody>
+      </p:sp>
+      <p:sp>
+        <p:nvSpPr>
+          <p:cNvPr id="4" name="スライド番号プレースホルダー 3"/>
+          <p:cNvSpPr>
+            <a:spLocks noGrp="1"/>
+          </p:cNvSpPr>
+          <p:nvPr>
+            <p:ph type="sldNum" sz="quarter" idx="5"/>
+          </p:nvPr>
+        </p:nvSpPr>
+        <p:spPr/>
+        <p:txBody>
+          <a:bodyPr/>
+          <a:lstStyle/>
+          <a:p>
+            <a:fld id="{1ADAC0CF-44CB-154A-BAFE-E085248CAD66}" type="slidenum">
+              <a:rPr kumimoji="1" lang="ja-JP" altLang="en-US" smtClean="0"/>
+              <a:t>5</a:t>
+            </a:fld>
+            <a:endParaRPr kumimoji="1" lang="ja-JP" altLang="en-US"/>
+          </a:p>
+        </p:txBody>
+      </p:sp>
+    </p:spTree>
+    <p:extLst>
+      <p:ext uri="{BB962C8B-B14F-4D97-AF65-F5344CB8AC3E}">
+        <p14:creationId xmlns:p14="http://schemas.microsoft.com/office/powerpoint/2010/main" val="2255751105"/>
+      </p:ext>
+    </p:extLst>
+  </p:cSld>
+  <p:clrMapOvr>
+    <a:masterClrMapping/>
+  </p:clrMapOvr>
+</p:notes>
+</file>
+
+<file path=ppt/notesSlides/notesSlide6.xml><?xml version="1.0" encoding="utf-8"?>
+<p:notes xmlns:a="http://schemas.openxmlformats.org/drawingml/2006/main" xmlns:r="http://schemas.openxmlformats.org/officeDocument/2006/relationships" xmlns:p="http://schemas.openxmlformats.org/presentationml/2006/main">
+  <p:cSld>
+    <p:spTree>
+      <p:nvGrpSpPr>
+        <p:cNvPr id="1" name=""/>
+        <p:cNvGrpSpPr/>
+        <p:nvPr/>
+      </p:nvGrpSpPr>
+      <p:grpSpPr>
+        <a:xfrm>
+          <a:off x="0" y="0"/>
+          <a:ext cx="0" cy="0"/>
+          <a:chOff x="0" y="0"/>
+          <a:chExt cx="0" cy="0"/>
+        </a:xfrm>
+      </p:grpSpPr>
+      <p:sp>
+        <p:nvSpPr>
+          <p:cNvPr id="2" name="スライド イメージ プレースホルダー 1"/>
+          <p:cNvSpPr>
+            <a:spLocks noGrp="1" noRot="1" noChangeAspect="1"/>
+          </p:cNvSpPr>
+          <p:nvPr>
+            <p:ph type="sldImg"/>
+          </p:nvPr>
+        </p:nvSpPr>
+        <p:spPr/>
+      </p:sp>
+      <p:sp>
+        <p:nvSpPr>
+          <p:cNvPr id="3" name="ノート プレースホルダー 2"/>
+          <p:cNvSpPr>
+            <a:spLocks noGrp="1"/>
+          </p:cNvSpPr>
+          <p:nvPr>
+            <p:ph type="body" idx="1"/>
+          </p:nvPr>
+        </p:nvSpPr>
+        <p:spPr/>
+        <p:txBody>
+          <a:bodyPr/>
+          <a:lstStyle/>
+          <a:p>
+            <a:endParaRPr kumimoji="1" lang="ja-JP" altLang="en-US"/>
+          </a:p>
+        </p:txBody>
+      </p:sp>
+      <p:sp>
+        <p:nvSpPr>
+          <p:cNvPr id="4" name="スライド番号プレースホルダー 3"/>
+          <p:cNvSpPr>
+            <a:spLocks noGrp="1"/>
+          </p:cNvSpPr>
+          <p:nvPr>
+            <p:ph type="sldNum" sz="quarter" idx="5"/>
+          </p:nvPr>
+        </p:nvSpPr>
+        <p:spPr/>
+        <p:txBody>
+          <a:bodyPr/>
+          <a:lstStyle/>
+          <a:p>
+            <a:fld id="{1ADAC0CF-44CB-154A-BAFE-E085248CAD66}" type="slidenum">
+              <a:rPr kumimoji="1" lang="ja-JP" altLang="en-US" smtClean="0"/>
+              <a:t>8</a:t>
+            </a:fld>
+            <a:endParaRPr kumimoji="1" lang="ja-JP" altLang="en-US"/>
+          </a:p>
+        </p:txBody>
+      </p:sp>
+    </p:spTree>
+    <p:extLst>
+      <p:ext uri="{BB962C8B-B14F-4D97-AF65-F5344CB8AC3E}">
+        <p14:creationId xmlns:p14="http://schemas.microsoft.com/office/powerpoint/2010/main" val="2263981135"/>
+      </p:ext>
+    </p:extLst>
+  </p:cSld>
+  <p:clrMapOvr>
+    <a:masterClrMapping/>
+  </p:clrMapOvr>
+</p:notes>
+</file>
+
+<file path=ppt/notesSlides/notesSlide7.xml><?xml version="1.0" encoding="utf-8"?>
+<p:notes xmlns:a="http://schemas.openxmlformats.org/drawingml/2006/main" xmlns:r="http://schemas.openxmlformats.org/officeDocument/2006/relationships" xmlns:p="http://schemas.openxmlformats.org/presentationml/2006/main">
+  <p:cSld>
+    <p:spTree>
+      <p:nvGrpSpPr>
+        <p:cNvPr id="1" name=""/>
+        <p:cNvGrpSpPr/>
+        <p:nvPr/>
+      </p:nvGrpSpPr>
+      <p:grpSpPr>
+        <a:xfrm>
+          <a:off x="0" y="0"/>
+          <a:ext cx="0" cy="0"/>
+          <a:chOff x="0" y="0"/>
+          <a:chExt cx="0" cy="0"/>
+        </a:xfrm>
+      </p:grpSpPr>
+      <p:sp>
+        <p:nvSpPr>
+          <p:cNvPr id="2" name="スライド イメージ プレースホルダー 1"/>
+          <p:cNvSpPr>
+            <a:spLocks noGrp="1" noRot="1" noChangeAspect="1"/>
+          </p:cNvSpPr>
+          <p:nvPr>
+            <p:ph type="sldImg"/>
+          </p:nvPr>
+        </p:nvSpPr>
+        <p:spPr/>
+      </p:sp>
+      <p:sp>
+        <p:nvSpPr>
+          <p:cNvPr id="3" name="ノート プレースホルダー 2"/>
+          <p:cNvSpPr>
+            <a:spLocks noGrp="1"/>
+          </p:cNvSpPr>
+          <p:nvPr>
+            <p:ph type="body" idx="1"/>
+          </p:nvPr>
+        </p:nvSpPr>
+        <p:spPr/>
+        <p:txBody>
+          <a:bodyPr/>
+          <a:lstStyle/>
+          <a:p>
+            <a:r>
+              <a:rPr kumimoji="1" lang="ja-JP" altLang="en-US"/>
+              <a:t>アクキュイジョン（アクワイヤー）</a:t>
+            </a:r>
+            <a:endParaRPr kumimoji="1" lang="en-US" altLang="ja-JP" dirty="0"/>
+          </a:p>
+          <a:p>
+            <a:r>
+              <a:rPr kumimoji="1" lang="ja-JP" altLang="en-US"/>
+              <a:t>パーティシペイション</a:t>
+            </a:r>
+            <a:endParaRPr kumimoji="1" lang="en-US" altLang="ja-JP" dirty="0"/>
+          </a:p>
+        </p:txBody>
+      </p:sp>
+      <p:sp>
+        <p:nvSpPr>
+          <p:cNvPr id="4" name="スライド番号プレースホルダー 3"/>
+          <p:cNvSpPr>
+            <a:spLocks noGrp="1"/>
+          </p:cNvSpPr>
+          <p:nvPr>
+            <p:ph type="sldNum" sz="quarter" idx="5"/>
+          </p:nvPr>
+        </p:nvSpPr>
+        <p:spPr/>
+        <p:txBody>
+          <a:bodyPr/>
+          <a:lstStyle/>
+          <a:p>
+            <a:fld id="{1ADAC0CF-44CB-154A-BAFE-E085248CAD66}" type="slidenum">
+              <a:rPr kumimoji="1" lang="ja-JP" altLang="en-US" smtClean="0"/>
+              <a:t>9</a:t>
+            </a:fld>
+            <a:endParaRPr kumimoji="1" lang="ja-JP" altLang="en-US"/>
+          </a:p>
+        </p:txBody>
+      </p:sp>
+    </p:spTree>
+    <p:extLst>
+      <p:ext uri="{BB962C8B-B14F-4D97-AF65-F5344CB8AC3E}">
+        <p14:creationId xmlns:p14="http://schemas.microsoft.com/office/powerpoint/2010/main" val="1874420822"/>
+      </p:ext>
+    </p:extLst>
+  </p:cSld>
+  <p:clrMapOvr>
+    <a:masterClrMapping/>
+  </p:clrMapOvr>
+</p:notes>
+</file>
+
+<file path=ppt/notesSlides/notesSlide8.xml><?xml version="1.0" encoding="utf-8"?>
+<p:notes xmlns:a="http://schemas.openxmlformats.org/drawingml/2006/main" xmlns:r="http://schemas.openxmlformats.org/officeDocument/2006/relationships" xmlns:p="http://schemas.openxmlformats.org/presentationml/2006/main">
+  <p:cSld>
+    <p:spTree>
+      <p:nvGrpSpPr>
+        <p:cNvPr id="1" name=""/>
+        <p:cNvGrpSpPr/>
+        <p:nvPr/>
+      </p:nvGrpSpPr>
+      <p:grpSpPr>
+        <a:xfrm>
+          <a:off x="0" y="0"/>
+          <a:ext cx="0" cy="0"/>
+          <a:chOff x="0" y="0"/>
+          <a:chExt cx="0" cy="0"/>
+        </a:xfrm>
+      </p:grpSpPr>
+      <p:sp>
+        <p:nvSpPr>
+          <p:cNvPr id="2" name="スライド イメージ プレースホルダー 1"/>
+          <p:cNvSpPr>
+            <a:spLocks noGrp="1" noRot="1" noChangeAspect="1"/>
+          </p:cNvSpPr>
+          <p:nvPr>
+            <p:ph type="sldImg"/>
+          </p:nvPr>
+        </p:nvSpPr>
+        <p:spPr/>
+      </p:sp>
+      <p:sp>
+        <p:nvSpPr>
+          <p:cNvPr id="3" name="ノート プレースホルダー 2"/>
+          <p:cNvSpPr>
+            <a:spLocks noGrp="1"/>
+          </p:cNvSpPr>
+          <p:nvPr>
+            <p:ph type="body" idx="1"/>
+          </p:nvPr>
+        </p:nvSpPr>
+        <p:spPr/>
+        <p:txBody>
+          <a:bodyPr/>
+          <a:lstStyle/>
+          <a:p>
+            <a:r>
+              <a:rPr kumimoji="1" lang="ja-JP" altLang="en-US"/>
+              <a:t>知識を提供する人，教授する人によって，今のスキルレベルが違う．</a:t>
+            </a:r>
+          </a:p>
+        </p:txBody>
+      </p:sp>
+      <p:sp>
+        <p:nvSpPr>
+          <p:cNvPr id="4" name="スライド番号プレースホルダー 3"/>
+          <p:cNvSpPr>
+            <a:spLocks noGrp="1"/>
+          </p:cNvSpPr>
+          <p:nvPr>
+            <p:ph type="sldNum" sz="quarter" idx="5"/>
+          </p:nvPr>
+        </p:nvSpPr>
+        <p:spPr/>
+        <p:txBody>
+          <a:bodyPr/>
+          <a:lstStyle/>
+          <a:p>
+            <a:fld id="{1ADAC0CF-44CB-154A-BAFE-E085248CAD66}" type="slidenum">
+              <a:rPr kumimoji="1" lang="ja-JP" altLang="en-US" smtClean="0"/>
+              <a:t>10</a:t>
+            </a:fld>
+            <a:endParaRPr kumimoji="1" lang="ja-JP" altLang="en-US"/>
+          </a:p>
+        </p:txBody>
+      </p:sp>
+    </p:spTree>
+    <p:extLst>
+      <p:ext uri="{BB962C8B-B14F-4D97-AF65-F5344CB8AC3E}">
+        <p14:creationId xmlns:p14="http://schemas.microsoft.com/office/powerpoint/2010/main" val="4011622725"/>
+      </p:ext>
+    </p:extLst>
+  </p:cSld>
+  <p:clrMapOvr>
+    <a:masterClrMapping/>
+  </p:clrMapOvr>
+</p:notes>
+</file>
+
 <file path=ppt/slideLayouts/slideLayout1.xml><?xml version="1.0" encoding="utf-8"?>
 <p:sldLayout xmlns:a="http://schemas.openxmlformats.org/drawingml/2006/main" xmlns:r="http://schemas.openxmlformats.org/officeDocument/2006/relationships" xmlns:p="http://schemas.openxmlformats.org/presentationml/2006/main" type="title" preserve="1">
   <p:cSld name="タイトル スライド">
@@ -267,7 +1362,7 @@
             <a:fld id="{5586B75A-687E-405C-8A0B-8D00578BA2C3}" type="datetimeFigureOut">
               <a:rPr lang="en-US" smtClean="0"/>
               <a:pPr/>
-              <a:t>9/17/18</a:t>
+              <a:t>9/18/18</a:t>
             </a:fld>
             <a:endParaRPr lang="en-US" dirty="0"/>
           </a:p>
@@ -474,7 +1569,7 @@
             <a:fld id="{5586B75A-687E-405C-8A0B-8D00578BA2C3}" type="datetimeFigureOut">
               <a:rPr lang="en-US" smtClean="0"/>
               <a:pPr/>
-              <a:t>9/17/18</a:t>
+              <a:t>9/18/18</a:t>
             </a:fld>
             <a:endParaRPr lang="en-US" dirty="0"/>
           </a:p>
@@ -691,7 +1786,7 @@
             <a:fld id="{5586B75A-687E-405C-8A0B-8D00578BA2C3}" type="datetimeFigureOut">
               <a:rPr lang="en-US" smtClean="0"/>
               <a:pPr/>
-              <a:t>9/17/18</a:t>
+              <a:t>9/18/18</a:t>
             </a:fld>
             <a:endParaRPr lang="en-US" dirty="0"/>
           </a:p>
@@ -898,7 +1993,7 @@
             <a:fld id="{5586B75A-687E-405C-8A0B-8D00578BA2C3}" type="datetimeFigureOut">
               <a:rPr lang="en-US" smtClean="0"/>
               <a:pPr/>
-              <a:t>9/17/18</a:t>
+              <a:t>9/18/18</a:t>
             </a:fld>
             <a:endParaRPr lang="en-US" dirty="0"/>
           </a:p>
@@ -1210,7 +2305,7 @@
             <a:fld id="{5586B75A-687E-405C-8A0B-8D00578BA2C3}" type="datetimeFigureOut">
               <a:rPr lang="en-US" smtClean="0"/>
               <a:pPr/>
-              <a:t>9/17/18</a:t>
+              <a:t>9/18/18</a:t>
             </a:fld>
             <a:endParaRPr lang="en-US" dirty="0"/>
           </a:p>
@@ -1491,7 +2586,7 @@
             <a:fld id="{5586B75A-687E-405C-8A0B-8D00578BA2C3}" type="datetimeFigureOut">
               <a:rPr lang="en-US" smtClean="0"/>
               <a:pPr/>
-              <a:t>9/17/18</a:t>
+              <a:t>9/18/18</a:t>
             </a:fld>
             <a:endParaRPr lang="en-US" dirty="0"/>
           </a:p>
@@ -1989,7 +3084,7 @@
             <a:fld id="{5586B75A-687E-405C-8A0B-8D00578BA2C3}" type="datetimeFigureOut">
               <a:rPr lang="en-US" smtClean="0"/>
               <a:pPr/>
-              <a:t>9/17/18</a:t>
+              <a:t>9/18/18</a:t>
             </a:fld>
             <a:endParaRPr lang="en-US" dirty="0"/>
           </a:p>
@@ -2132,7 +3227,7 @@
             <a:fld id="{5586B75A-687E-405C-8A0B-8D00578BA2C3}" type="datetimeFigureOut">
               <a:rPr lang="en-US" smtClean="0"/>
               <a:pPr/>
-              <a:t>9/17/18</a:t>
+              <a:t>9/18/18</a:t>
             </a:fld>
             <a:endParaRPr lang="en-US" dirty="0"/>
           </a:p>
@@ -2247,7 +3342,7 @@
             <a:fld id="{5586B75A-687E-405C-8A0B-8D00578BA2C3}" type="datetimeFigureOut">
               <a:rPr lang="en-US" smtClean="0"/>
               <a:pPr/>
-              <a:t>9/17/18</a:t>
+              <a:t>9/18/18</a:t>
             </a:fld>
             <a:endParaRPr lang="en-US" dirty="0"/>
           </a:p>
@@ -2602,7 +3697,7 @@
             <a:fld id="{5586B75A-687E-405C-8A0B-8D00578BA2C3}" type="datetimeFigureOut">
               <a:rPr lang="en-US" smtClean="0"/>
               <a:pPr/>
-              <a:t>9/17/18</a:t>
+              <a:t>9/18/18</a:t>
             </a:fld>
             <a:endParaRPr lang="en-US" dirty="0"/>
           </a:p>
@@ -2927,7 +4022,7 @@
             <a:fld id="{5586B75A-687E-405C-8A0B-8D00578BA2C3}" type="datetimeFigureOut">
               <a:rPr lang="en-US" smtClean="0"/>
               <a:pPr/>
-              <a:t>9/17/18</a:t>
+              <a:t>9/18/18</a:t>
             </a:fld>
             <a:endParaRPr lang="en-US" dirty="0"/>
           </a:p>
@@ -3178,7 +4273,7 @@
             <a:fld id="{5586B75A-687E-405C-8A0B-8D00578BA2C3}" type="datetimeFigureOut">
               <a:rPr lang="en-US" smtClean="0"/>
               <a:pPr/>
-              <a:t>9/17/18</a:t>
+              <a:t>9/18/18</a:t>
             </a:fld>
             <a:endParaRPr lang="en-US" dirty="0"/>
           </a:p>
@@ -3622,7 +4717,7 @@
           <a:p>
             <a:r>
               <a:rPr kumimoji="1" lang="en-US" altLang="ja-JP" sz="5400" dirty="0"/>
-              <a:t>Memo</a:t>
+              <a:t>memo</a:t>
             </a:r>
             <a:r>
               <a:rPr kumimoji="1" lang="ja-JP" altLang="en-US" sz="5400"/>
@@ -3687,6 +4782,494 @@
     <p:extLst>
       <p:ext uri="{BB962C8B-B14F-4D97-AF65-F5344CB8AC3E}">
         <p14:creationId xmlns:p14="http://schemas.microsoft.com/office/powerpoint/2010/main" val="3600828643"/>
+      </p:ext>
+    </p:extLst>
+  </p:cSld>
+  <p:clrMapOvr>
+    <a:masterClrMapping/>
+  </p:clrMapOvr>
+</p:sld>
+</file>
+
+<file path=ppt/slides/slide10.xml><?xml version="1.0" encoding="utf-8"?>
+<p:sld xmlns:a="http://schemas.openxmlformats.org/drawingml/2006/main" xmlns:r="http://schemas.openxmlformats.org/officeDocument/2006/relationships" xmlns:p="http://schemas.openxmlformats.org/presentationml/2006/main">
+  <p:cSld>
+    <p:spTree>
+      <p:nvGrpSpPr>
+        <p:cNvPr id="1" name=""/>
+        <p:cNvGrpSpPr/>
+        <p:nvPr/>
+      </p:nvGrpSpPr>
+      <p:grpSpPr>
+        <a:xfrm>
+          <a:off x="0" y="0"/>
+          <a:ext cx="0" cy="0"/>
+          <a:chOff x="0" y="0"/>
+          <a:chExt cx="0" cy="0"/>
+        </a:xfrm>
+      </p:grpSpPr>
+      <p:sp>
+        <p:nvSpPr>
+          <p:cNvPr id="2" name="テキスト ボックス 1">
+            <a:extLst>
+              <a:ext uri="{FF2B5EF4-FFF2-40B4-BE49-F238E27FC236}">
+                <a16:creationId xmlns:a16="http://schemas.microsoft.com/office/drawing/2014/main" id="{70781E77-2F6B-C740-B5FE-4CF20DC9AE02}"/>
+              </a:ext>
+            </a:extLst>
+          </p:cNvPr>
+          <p:cNvSpPr txBox="1"/>
+          <p:nvPr/>
+        </p:nvSpPr>
+        <p:spPr>
+          <a:xfrm>
+            <a:off x="2314289" y="323610"/>
+            <a:ext cx="7169727" cy="769441"/>
+          </a:xfrm>
+          <a:prstGeom prst="rect">
+            <a:avLst/>
+          </a:prstGeom>
+          <a:noFill/>
+        </p:spPr>
+        <p:txBody>
+          <a:bodyPr wrap="square" rtlCol="0">
+            <a:spAutoFit/>
+          </a:bodyPr>
+          <a:lstStyle/>
+          <a:p>
+            <a:pPr algn="ctr"/>
+            <a:r>
+              <a:rPr kumimoji="1" lang="ja-JP" altLang="en-US" sz="4400"/>
+              <a:t>開発目標</a:t>
+            </a:r>
+          </a:p>
+        </p:txBody>
+      </p:sp>
+      <p:sp>
+        <p:nvSpPr>
+          <p:cNvPr id="3" name="テキスト ボックス 2">
+            <a:extLst>
+              <a:ext uri="{FF2B5EF4-FFF2-40B4-BE49-F238E27FC236}">
+                <a16:creationId xmlns:a16="http://schemas.microsoft.com/office/drawing/2014/main" id="{6A83FB72-7E91-3449-913B-1789742662B0}"/>
+              </a:ext>
+            </a:extLst>
+          </p:cNvPr>
+          <p:cNvSpPr txBox="1"/>
+          <p:nvPr/>
+        </p:nvSpPr>
+        <p:spPr>
+          <a:xfrm>
+            <a:off x="1732861" y="3012322"/>
+            <a:ext cx="6598228" cy="707886"/>
+          </a:xfrm>
+          <a:prstGeom prst="rect">
+            <a:avLst/>
+          </a:prstGeom>
+          <a:noFill/>
+        </p:spPr>
+        <p:txBody>
+          <a:bodyPr wrap="square" rtlCol="0">
+            <a:spAutoFit/>
+          </a:bodyPr>
+          <a:lstStyle/>
+          <a:p>
+            <a:r>
+              <a:rPr kumimoji="1" lang="en-US" altLang="ja-JP" sz="4000" dirty="0"/>
+              <a:t>git</a:t>
+            </a:r>
+            <a:r>
+              <a:rPr kumimoji="1" lang="ja-JP" altLang="en-US" sz="4000"/>
+              <a:t>の</a:t>
+            </a:r>
+            <a:r>
+              <a:rPr kumimoji="1" lang="en-US" altLang="ja-JP" sz="4000" dirty="0"/>
+              <a:t>repository</a:t>
+            </a:r>
+            <a:endParaRPr kumimoji="1" lang="ja-JP" altLang="en-US" sz="4000"/>
+          </a:p>
+        </p:txBody>
+      </p:sp>
+      <p:sp>
+        <p:nvSpPr>
+          <p:cNvPr id="4" name="テキスト ボックス 3">
+            <a:extLst>
+              <a:ext uri="{FF2B5EF4-FFF2-40B4-BE49-F238E27FC236}">
+                <a16:creationId xmlns:a16="http://schemas.microsoft.com/office/drawing/2014/main" id="{863DF869-A6C9-D549-9DC2-220C4DB93CCC}"/>
+              </a:ext>
+            </a:extLst>
+          </p:cNvPr>
+          <p:cNvSpPr txBox="1"/>
+          <p:nvPr/>
+        </p:nvSpPr>
+        <p:spPr>
+          <a:xfrm>
+            <a:off x="1732861" y="4095068"/>
+            <a:ext cx="5878243" cy="707886"/>
+          </a:xfrm>
+          <a:prstGeom prst="rect">
+            <a:avLst/>
+          </a:prstGeom>
+          <a:noFill/>
+        </p:spPr>
+        <p:txBody>
+          <a:bodyPr wrap="square" rtlCol="0">
+            <a:spAutoFit/>
+          </a:bodyPr>
+          <a:lstStyle/>
+          <a:p>
+            <a:r>
+              <a:rPr kumimoji="1" lang="en-US" altLang="ja-JP" sz="4000" dirty="0"/>
+              <a:t>Web</a:t>
+            </a:r>
+            <a:r>
+              <a:rPr kumimoji="1" lang="ja-JP" altLang="en-US" sz="4000"/>
+              <a:t>による表示</a:t>
+            </a:r>
+          </a:p>
+        </p:txBody>
+      </p:sp>
+      <p:sp>
+        <p:nvSpPr>
+          <p:cNvPr id="5" name="テキスト ボックス 4">
+            <a:extLst>
+              <a:ext uri="{FF2B5EF4-FFF2-40B4-BE49-F238E27FC236}">
+                <a16:creationId xmlns:a16="http://schemas.microsoft.com/office/drawing/2014/main" id="{C3117551-1FFE-A94A-9787-D48D969BD39F}"/>
+              </a:ext>
+            </a:extLst>
+          </p:cNvPr>
+          <p:cNvSpPr txBox="1"/>
+          <p:nvPr/>
+        </p:nvSpPr>
+        <p:spPr>
+          <a:xfrm>
+            <a:off x="1732861" y="5753547"/>
+            <a:ext cx="7654034" cy="707886"/>
+          </a:xfrm>
+          <a:prstGeom prst="rect">
+            <a:avLst/>
+          </a:prstGeom>
+          <a:noFill/>
+        </p:spPr>
+        <p:txBody>
+          <a:bodyPr wrap="square" rtlCol="0">
+            <a:spAutoFit/>
+          </a:bodyPr>
+          <a:lstStyle/>
+          <a:p>
+            <a:r>
+              <a:rPr kumimoji="1" lang="en-US" altLang="ja-JP" sz="4000" dirty="0"/>
+              <a:t>Point</a:t>
+            </a:r>
+            <a:r>
+              <a:rPr kumimoji="1" lang="ja-JP" altLang="en-US" sz="4000"/>
+              <a:t>付加によるランク付け</a:t>
+            </a:r>
+          </a:p>
+        </p:txBody>
+      </p:sp>
+      <p:sp>
+        <p:nvSpPr>
+          <p:cNvPr id="6" name="テキスト ボックス 5">
+            <a:extLst>
+              <a:ext uri="{FF2B5EF4-FFF2-40B4-BE49-F238E27FC236}">
+                <a16:creationId xmlns:a16="http://schemas.microsoft.com/office/drawing/2014/main" id="{F3922AC5-C6C2-A142-BCD3-C16C9AE920C6}"/>
+              </a:ext>
+            </a:extLst>
+          </p:cNvPr>
+          <p:cNvSpPr txBox="1"/>
+          <p:nvPr/>
+        </p:nvSpPr>
+        <p:spPr>
+          <a:xfrm>
+            <a:off x="622852" y="1437133"/>
+            <a:ext cx="11277600" cy="1200329"/>
+          </a:xfrm>
+          <a:prstGeom prst="rect">
+            <a:avLst/>
+          </a:prstGeom>
+          <a:noFill/>
+        </p:spPr>
+        <p:txBody>
+          <a:bodyPr wrap="square" rtlCol="0">
+            <a:spAutoFit/>
+          </a:bodyPr>
+          <a:lstStyle/>
+          <a:p>
+            <a:r>
+              <a:rPr kumimoji="1" lang="en-US" altLang="ja-JP" sz="3600" dirty="0" err="1"/>
+              <a:t>my_help</a:t>
+            </a:r>
+            <a:r>
+              <a:rPr kumimoji="1" lang="ja-JP" altLang="en-US" sz="3600"/>
+              <a:t>内の知識を共有するシステムを作成する．</a:t>
+            </a:r>
+            <a:endParaRPr kumimoji="1" lang="en-US" altLang="ja-JP" sz="3600" dirty="0"/>
+          </a:p>
+          <a:p>
+            <a:r>
+              <a:rPr kumimoji="1" lang="ja-JP" altLang="en-US" sz="3600"/>
+              <a:t>それに伴い，主に以下の</a:t>
+            </a:r>
+            <a:r>
+              <a:rPr kumimoji="1" lang="en-US" altLang="ja-JP" sz="3600" dirty="0"/>
+              <a:t>3</a:t>
+            </a:r>
+            <a:r>
+              <a:rPr kumimoji="1" lang="ja-JP" altLang="en-US" sz="3600"/>
+              <a:t>点の機能を取り入れる．</a:t>
+            </a:r>
+          </a:p>
+        </p:txBody>
+      </p:sp>
+      <p:sp>
+        <p:nvSpPr>
+          <p:cNvPr id="9" name="雲 8">
+            <a:extLst>
+              <a:ext uri="{FF2B5EF4-FFF2-40B4-BE49-F238E27FC236}">
+                <a16:creationId xmlns:a16="http://schemas.microsoft.com/office/drawing/2014/main" id="{3B0152BD-3B19-0844-8384-39B3F1B64CB3}"/>
+              </a:ext>
+            </a:extLst>
+          </p:cNvPr>
+          <p:cNvSpPr/>
+          <p:nvPr/>
+        </p:nvSpPr>
+        <p:spPr>
+          <a:xfrm>
+            <a:off x="640061" y="3005994"/>
+            <a:ext cx="902525" cy="676893"/>
+          </a:xfrm>
+          <a:prstGeom prst="cloud">
+            <a:avLst/>
+          </a:prstGeom>
+          <a:solidFill>
+            <a:schemeClr val="accent4"/>
+          </a:solidFill>
+          <a:ln>
+            <a:noFill/>
+          </a:ln>
+          <a:effectLst>
+            <a:softEdge rad="50800"/>
+          </a:effectLst>
+        </p:spPr>
+        <p:style>
+          <a:lnRef idx="2">
+            <a:schemeClr val="accent1">
+              <a:shade val="50000"/>
+            </a:schemeClr>
+          </a:lnRef>
+          <a:fillRef idx="1">
+            <a:schemeClr val="accent1"/>
+          </a:fillRef>
+          <a:effectRef idx="0">
+            <a:schemeClr val="accent1"/>
+          </a:effectRef>
+          <a:fontRef idx="minor">
+            <a:schemeClr val="lt1"/>
+          </a:fontRef>
+        </p:style>
+        <p:txBody>
+          <a:bodyPr rtlCol="0" anchor="ctr"/>
+          <a:lstStyle/>
+          <a:p>
+            <a:pPr algn="ctr"/>
+            <a:endParaRPr kumimoji="1" lang="ja-JP" altLang="en-US"/>
+          </a:p>
+        </p:txBody>
+      </p:sp>
+      <p:sp>
+        <p:nvSpPr>
+          <p:cNvPr id="10" name="雲 9">
+            <a:extLst>
+              <a:ext uri="{FF2B5EF4-FFF2-40B4-BE49-F238E27FC236}">
+                <a16:creationId xmlns:a16="http://schemas.microsoft.com/office/drawing/2014/main" id="{A0776A33-803F-ED47-BD01-8DCDFE579EA9}"/>
+              </a:ext>
+            </a:extLst>
+          </p:cNvPr>
+          <p:cNvSpPr/>
+          <p:nvPr/>
+        </p:nvSpPr>
+        <p:spPr>
+          <a:xfrm>
+            <a:off x="622851" y="4110564"/>
+            <a:ext cx="902525" cy="676893"/>
+          </a:xfrm>
+          <a:prstGeom prst="cloud">
+            <a:avLst/>
+          </a:prstGeom>
+          <a:solidFill>
+            <a:schemeClr val="accent4"/>
+          </a:solidFill>
+          <a:ln>
+            <a:noFill/>
+          </a:ln>
+          <a:effectLst>
+            <a:softEdge rad="50800"/>
+          </a:effectLst>
+        </p:spPr>
+        <p:style>
+          <a:lnRef idx="2">
+            <a:schemeClr val="accent1">
+              <a:shade val="50000"/>
+            </a:schemeClr>
+          </a:lnRef>
+          <a:fillRef idx="1">
+            <a:schemeClr val="accent1"/>
+          </a:fillRef>
+          <a:effectRef idx="0">
+            <a:schemeClr val="accent1"/>
+          </a:effectRef>
+          <a:fontRef idx="minor">
+            <a:schemeClr val="lt1"/>
+          </a:fontRef>
+        </p:style>
+        <p:txBody>
+          <a:bodyPr rtlCol="0" anchor="ctr"/>
+          <a:lstStyle/>
+          <a:p>
+            <a:pPr algn="ctr"/>
+            <a:endParaRPr kumimoji="1" lang="ja-JP" altLang="en-US"/>
+          </a:p>
+        </p:txBody>
+      </p:sp>
+      <p:sp>
+        <p:nvSpPr>
+          <p:cNvPr id="11" name="雲 10">
+            <a:extLst>
+              <a:ext uri="{FF2B5EF4-FFF2-40B4-BE49-F238E27FC236}">
+                <a16:creationId xmlns:a16="http://schemas.microsoft.com/office/drawing/2014/main" id="{4ECB4129-7048-4E4A-983E-01383A891FDC}"/>
+              </a:ext>
+            </a:extLst>
+          </p:cNvPr>
+          <p:cNvSpPr/>
+          <p:nvPr/>
+        </p:nvSpPr>
+        <p:spPr>
+          <a:xfrm>
+            <a:off x="640060" y="5753547"/>
+            <a:ext cx="902525" cy="676893"/>
+          </a:xfrm>
+          <a:prstGeom prst="cloud">
+            <a:avLst/>
+          </a:prstGeom>
+          <a:solidFill>
+            <a:schemeClr val="accent4"/>
+          </a:solidFill>
+          <a:ln>
+            <a:noFill/>
+          </a:ln>
+          <a:effectLst>
+            <a:softEdge rad="50800"/>
+          </a:effectLst>
+        </p:spPr>
+        <p:style>
+          <a:lnRef idx="2">
+            <a:schemeClr val="accent1">
+              <a:shade val="50000"/>
+            </a:schemeClr>
+          </a:lnRef>
+          <a:fillRef idx="1">
+            <a:schemeClr val="accent1"/>
+          </a:fillRef>
+          <a:effectRef idx="0">
+            <a:schemeClr val="accent1"/>
+          </a:effectRef>
+          <a:fontRef idx="minor">
+            <a:schemeClr val="lt1"/>
+          </a:fontRef>
+        </p:style>
+        <p:txBody>
+          <a:bodyPr rtlCol="0" anchor="ctr"/>
+          <a:lstStyle/>
+          <a:p>
+            <a:pPr algn="ctr"/>
+            <a:endParaRPr kumimoji="1" lang="ja-JP" altLang="en-US"/>
+          </a:p>
+        </p:txBody>
+      </p:sp>
+      <p:sp>
+        <p:nvSpPr>
+          <p:cNvPr id="7" name="正方形/長方形 6">
+            <a:extLst>
+              <a:ext uri="{FF2B5EF4-FFF2-40B4-BE49-F238E27FC236}">
+                <a16:creationId xmlns:a16="http://schemas.microsoft.com/office/drawing/2014/main" id="{26284F3F-EB92-A542-9D95-17056907FB22}"/>
+              </a:ext>
+            </a:extLst>
+          </p:cNvPr>
+          <p:cNvSpPr/>
+          <p:nvPr/>
+        </p:nvSpPr>
+        <p:spPr>
+          <a:xfrm>
+            <a:off x="2716056" y="4802954"/>
+            <a:ext cx="8392041" cy="707886"/>
+          </a:xfrm>
+          <a:prstGeom prst="rect">
+            <a:avLst/>
+          </a:prstGeom>
+        </p:spPr>
+        <p:txBody>
+          <a:bodyPr wrap="none">
+            <a:spAutoFit/>
+          </a:bodyPr>
+          <a:lstStyle/>
+          <a:p>
+            <a:r>
+              <a:rPr kumimoji="1" lang="ja-JP" altLang="en-US" sz="4000"/>
+              <a:t>スキルレベルによる内容，記述選択</a:t>
+            </a:r>
+            <a:endParaRPr lang="ja-JP" altLang="en-US" sz="4000"/>
+          </a:p>
+        </p:txBody>
+      </p:sp>
+      <p:sp>
+        <p:nvSpPr>
+          <p:cNvPr id="8" name="右矢印 7">
+            <a:extLst>
+              <a:ext uri="{FF2B5EF4-FFF2-40B4-BE49-F238E27FC236}">
+                <a16:creationId xmlns:a16="http://schemas.microsoft.com/office/drawing/2014/main" id="{0D923C8C-6C13-534D-A360-FED519BF5601}"/>
+              </a:ext>
+            </a:extLst>
+          </p:cNvPr>
+          <p:cNvSpPr/>
+          <p:nvPr/>
+        </p:nvSpPr>
+        <p:spPr>
+          <a:xfrm>
+            <a:off x="1732861" y="4802954"/>
+            <a:ext cx="983195" cy="583240"/>
+          </a:xfrm>
+          <a:prstGeom prst="rightArrow">
+            <a:avLst/>
+          </a:prstGeom>
+        </p:spPr>
+        <p:style>
+          <a:lnRef idx="2">
+            <a:schemeClr val="accent1">
+              <a:shade val="50000"/>
+            </a:schemeClr>
+          </a:lnRef>
+          <a:fillRef idx="1">
+            <a:schemeClr val="accent1"/>
+          </a:fillRef>
+          <a:effectRef idx="0">
+            <a:schemeClr val="accent1"/>
+          </a:effectRef>
+          <a:fontRef idx="minor">
+            <a:schemeClr val="lt1"/>
+          </a:fontRef>
+        </p:style>
+        <p:txBody>
+          <a:bodyPr rtlCol="0" anchor="ctr"/>
+          <a:lstStyle/>
+          <a:p>
+            <a:pPr algn="ctr"/>
+            <a:endParaRPr kumimoji="1" lang="ja-JP" altLang="en-US"/>
+          </a:p>
+        </p:txBody>
+      </p:sp>
+    </p:spTree>
+    <p:extLst>
+      <p:ext uri="{BB962C8B-B14F-4D97-AF65-F5344CB8AC3E}">
+        <p14:creationId xmlns:p14="http://schemas.microsoft.com/office/powerpoint/2010/main" val="3302818942"/>
       </p:ext>
     </p:extLst>
   </p:cSld>
@@ -3735,7 +5318,7 @@
         </p:nvSpPr>
         <p:spPr>
           <a:xfrm>
-            <a:off x="1020416" y="503583"/>
+            <a:off x="1020416" y="1000540"/>
             <a:ext cx="10614992" cy="769441"/>
           </a:xfrm>
           <a:prstGeom prst="rect">
@@ -3828,7 +5411,7 @@
         <p:spPr>
           <a:xfrm>
             <a:off x="3099652" y="2700628"/>
-            <a:ext cx="8823249" cy="3170099"/>
+            <a:ext cx="8905002" cy="3170099"/>
           </a:xfrm>
           <a:prstGeom prst="rect">
             <a:avLst/>
@@ -3879,7 +5462,7 @@
           <a:p>
             <a:r>
               <a:rPr kumimoji="1" lang="ja-JP" altLang="en-US" sz="4000"/>
-              <a:t>　　　　　　　　　ことがよくある</a:t>
+              <a:t>　　　　　　　　　などがよくある</a:t>
             </a:r>
           </a:p>
         </p:txBody>
@@ -4026,7 +5609,7 @@
           <p:nvPr/>
         </p:nvPicPr>
         <p:blipFill>
-          <a:blip r:embed="rId2"/>
+          <a:blip r:embed="rId3"/>
           <a:stretch>
             <a:fillRect/>
           </a:stretch>
@@ -4102,7 +5685,7 @@
           <p:nvPr/>
         </p:nvPicPr>
         <p:blipFill>
-          <a:blip r:embed="rId3"/>
+          <a:blip r:embed="rId4"/>
           <a:stretch>
             <a:fillRect/>
           </a:stretch>
@@ -4201,8 +5784,8 @@
         </p:nvSpPr>
         <p:spPr>
           <a:xfrm>
-            <a:off x="1652155" y="1166178"/>
-            <a:ext cx="10168784" cy="5078313"/>
+            <a:off x="1702955" y="1623378"/>
+            <a:ext cx="10168784" cy="4401205"/>
           </a:xfrm>
           <a:prstGeom prst="rect">
             <a:avLst/>
@@ -4242,27 +5825,7 @@
             <a:endParaRPr kumimoji="1" lang="en-US" altLang="ja-JP" sz="4000" dirty="0"/>
           </a:p>
           <a:p>
-            <a:endParaRPr kumimoji="1" lang="en-US" altLang="ja-JP" sz="1400" dirty="0"/>
-          </a:p>
-          <a:p>
-            <a:endParaRPr kumimoji="1" lang="en-US" altLang="ja-JP" sz="1400" dirty="0"/>
-          </a:p>
-          <a:p>
-            <a:r>
-              <a:rPr kumimoji="1" lang="en-US" altLang="ja-JP" sz="4000" dirty="0"/>
-              <a:t>Markdown</a:t>
-            </a:r>
-            <a:r>
-              <a:rPr kumimoji="1" lang="ja-JP" altLang="en-US" sz="4000"/>
-              <a:t>記法．</a:t>
-            </a:r>
             <a:endParaRPr kumimoji="1" lang="en-US" altLang="ja-JP" sz="4000" dirty="0"/>
-          </a:p>
-          <a:p>
-            <a:endParaRPr kumimoji="1" lang="en-US" altLang="ja-JP" sz="1400" dirty="0"/>
-          </a:p>
-          <a:p>
-            <a:endParaRPr kumimoji="1" lang="en-US" altLang="ja-JP" sz="1400" dirty="0"/>
           </a:p>
           <a:p>
             <a:r>
@@ -4292,10 +5855,7 @@
             <a:endParaRPr kumimoji="1" lang="en-US" altLang="ja-JP" sz="4000" dirty="0"/>
           </a:p>
           <a:p>
-            <a:endParaRPr kumimoji="1" lang="en-US" altLang="ja-JP" sz="1400" dirty="0"/>
-          </a:p>
-          <a:p>
-            <a:endParaRPr kumimoji="1" lang="en-US" altLang="ja-JP" sz="1400" dirty="0"/>
+            <a:endParaRPr kumimoji="1" lang="en-US" altLang="ja-JP" sz="4000" dirty="0"/>
           </a:p>
           <a:p>
             <a:r>
@@ -4341,14 +5901,14 @@
           <p:nvPr/>
         </p:nvPicPr>
         <p:blipFill>
-          <a:blip r:embed="rId2"/>
+          <a:blip r:embed="rId3"/>
           <a:stretch>
             <a:fillRect/>
           </a:stretch>
         </p:blipFill>
         <p:spPr>
           <a:xfrm>
-            <a:off x="698202" y="3113623"/>
+            <a:off x="698202" y="4570754"/>
             <a:ext cx="719425" cy="719425"/>
           </a:xfrm>
           <a:prstGeom prst="rect">
@@ -4371,14 +5931,14 @@
           <p:nvPr/>
         </p:nvPicPr>
         <p:blipFill>
-          <a:blip r:embed="rId2"/>
+          <a:blip r:embed="rId3"/>
           <a:stretch>
             <a:fillRect/>
           </a:stretch>
         </p:blipFill>
         <p:spPr>
           <a:xfrm>
-            <a:off x="701601" y="1088584"/>
+            <a:off x="701601" y="1545781"/>
             <a:ext cx="719425" cy="719425"/>
           </a:xfrm>
           <a:prstGeom prst="rect">
@@ -4401,44 +5961,14 @@
           <p:nvPr/>
         </p:nvPicPr>
         <p:blipFill>
-          <a:blip r:embed="rId2"/>
+          <a:blip r:embed="rId3"/>
           <a:stretch>
             <a:fillRect/>
           </a:stretch>
         </p:blipFill>
         <p:spPr>
           <a:xfrm>
-            <a:off x="701601" y="2061103"/>
-            <a:ext cx="719425" cy="719425"/>
-          </a:xfrm>
-          <a:prstGeom prst="rect">
-            <a:avLst/>
-          </a:prstGeom>
-        </p:spPr>
-      </p:pic>
-      <p:pic>
-        <p:nvPicPr>
-          <p:cNvPr id="11" name="図 10">
-            <a:extLst>
-              <a:ext uri="{FF2B5EF4-FFF2-40B4-BE49-F238E27FC236}">
-                <a16:creationId xmlns:a16="http://schemas.microsoft.com/office/drawing/2014/main" id="{92214B7E-54C6-DC4F-BD94-954D3C9528D1}"/>
-              </a:ext>
-            </a:extLst>
-          </p:cNvPr>
-          <p:cNvPicPr>
-            <a:picLocks noChangeAspect="1"/>
-          </p:cNvPicPr>
-          <p:nvPr/>
-        </p:nvPicPr>
-        <p:blipFill>
-          <a:blip r:embed="rId2"/>
-          <a:stretch>
-            <a:fillRect/>
-          </a:stretch>
-        </p:blipFill>
-        <p:spPr>
-          <a:xfrm>
-            <a:off x="698202" y="4778949"/>
+            <a:off x="701601" y="2806166"/>
             <a:ext cx="719425" cy="719425"/>
           </a:xfrm>
           <a:prstGeom prst="rect">
@@ -4481,7 +6011,7 @@
           <p:cNvPr id="2" name="テキスト ボックス 1">
             <a:extLst>
               <a:ext uri="{FF2B5EF4-FFF2-40B4-BE49-F238E27FC236}">
-                <a16:creationId xmlns:a16="http://schemas.microsoft.com/office/drawing/2014/main" id="{2304BA78-B549-BD40-8EB3-F19E35CDE63A}"/>
+                <a16:creationId xmlns:a16="http://schemas.microsoft.com/office/drawing/2014/main" id="{CE46A7A7-32B3-7443-AB05-238C4B3566B2}"/>
               </a:ext>
             </a:extLst>
           </p:cNvPr>
@@ -4490,8 +6020,8 @@
         </p:nvSpPr>
         <p:spPr>
           <a:xfrm>
-            <a:off x="2190916" y="331513"/>
-            <a:ext cx="7867483" cy="769441"/>
+            <a:off x="2731511" y="319143"/>
+            <a:ext cx="6548870" cy="769441"/>
           </a:xfrm>
           <a:prstGeom prst="rect">
             <a:avLst/>
@@ -4504,24 +6034,24 @@
           </a:bodyPr>
           <a:lstStyle/>
           <a:p>
-            <a:pPr algn="ctr"/>
             <a:r>
               <a:rPr kumimoji="1" lang="en-US" altLang="ja-JP" sz="4400" dirty="0" err="1"/>
               <a:t>my_help</a:t>
             </a:r>
             <a:r>
               <a:rPr kumimoji="1" lang="ja-JP" altLang="en-US" sz="4400"/>
-              <a:t>の振る舞い</a:t>
-            </a:r>
+              <a:t>の特徴と利点</a:t>
+            </a:r>
+            <a:endParaRPr kumimoji="1" lang="en-US" altLang="ja-JP" sz="4400" dirty="0"/>
           </a:p>
         </p:txBody>
       </p:sp>
       <p:pic>
         <p:nvPicPr>
-          <p:cNvPr id="5" name="図 4">
-            <a:extLst>
-              <a:ext uri="{FF2B5EF4-FFF2-40B4-BE49-F238E27FC236}">
-                <a16:creationId xmlns:a16="http://schemas.microsoft.com/office/drawing/2014/main" id="{B6B5FFD5-F7F5-224E-A716-C6BBAB1EC885}"/>
+          <p:cNvPr id="7" name="図 6">
+            <a:extLst>
+              <a:ext uri="{FF2B5EF4-FFF2-40B4-BE49-F238E27FC236}">
+                <a16:creationId xmlns:a16="http://schemas.microsoft.com/office/drawing/2014/main" id="{43595CEA-2918-7E48-A53E-FC25C4882C7A}"/>
               </a:ext>
             </a:extLst>
           </p:cNvPr>
@@ -4531,97 +6061,143 @@
           <p:nvPr/>
         </p:nvPicPr>
         <p:blipFill>
-          <a:blip r:embed="rId2"/>
+          <a:blip r:embed="rId3"/>
           <a:stretch>
             <a:fillRect/>
           </a:stretch>
         </p:blipFill>
         <p:spPr>
           <a:xfrm>
-            <a:off x="-279234" y="1548863"/>
-            <a:ext cx="7368966" cy="5309137"/>
+            <a:off x="706248" y="2880167"/>
+            <a:ext cx="719425" cy="719425"/>
           </a:xfrm>
           <a:prstGeom prst="rect">
             <a:avLst/>
           </a:prstGeom>
         </p:spPr>
       </p:pic>
-      <p:sp>
-        <p:nvSpPr>
-          <p:cNvPr id="6" name="テキスト ボックス 5">
-            <a:extLst>
-              <a:ext uri="{FF2B5EF4-FFF2-40B4-BE49-F238E27FC236}">
-                <a16:creationId xmlns:a16="http://schemas.microsoft.com/office/drawing/2014/main" id="{4EE341B6-0457-C646-96F1-55F43A0B58F4}"/>
-              </a:ext>
-            </a:extLst>
-          </p:cNvPr>
-          <p:cNvSpPr txBox="1"/>
+      <p:pic>
+        <p:nvPicPr>
+          <p:cNvPr id="10" name="図 9">
+            <a:extLst>
+              <a:ext uri="{FF2B5EF4-FFF2-40B4-BE49-F238E27FC236}">
+                <a16:creationId xmlns:a16="http://schemas.microsoft.com/office/drawing/2014/main" id="{55F70199-0901-4142-AC63-98080EDB2FA0}"/>
+              </a:ext>
+            </a:extLst>
+          </p:cNvPr>
+          <p:cNvPicPr>
+            <a:picLocks noChangeAspect="1"/>
+          </p:cNvPicPr>
           <p:nvPr/>
-        </p:nvSpPr>
+        </p:nvPicPr>
+        <p:blipFill>
+          <a:blip r:embed="rId3"/>
+          <a:stretch>
+            <a:fillRect/>
+          </a:stretch>
+        </p:blipFill>
         <p:spPr>
           <a:xfrm>
-            <a:off x="6789107" y="2601050"/>
-            <a:ext cx="4977008" cy="2862322"/>
+            <a:off x="706248" y="1617629"/>
+            <a:ext cx="719425" cy="719425"/>
           </a:xfrm>
           <a:prstGeom prst="rect">
             <a:avLst/>
           </a:prstGeom>
-          <a:noFill/>
         </p:spPr>
-        <p:txBody>
-          <a:bodyPr wrap="square" rtlCol="0">
+      </p:pic>
+      <p:pic>
+        <p:nvPicPr>
+          <p:cNvPr id="11" name="図 10">
+            <a:extLst>
+              <a:ext uri="{FF2B5EF4-FFF2-40B4-BE49-F238E27FC236}">
+                <a16:creationId xmlns:a16="http://schemas.microsoft.com/office/drawing/2014/main" id="{92214B7E-54C6-DC4F-BD94-954D3C9528D1}"/>
+              </a:ext>
+            </a:extLst>
+          </p:cNvPr>
+          <p:cNvPicPr>
+            <a:picLocks noChangeAspect="1"/>
+          </p:cNvPicPr>
+          <p:nvPr/>
+        </p:nvPicPr>
+        <p:blipFill>
+          <a:blip r:embed="rId3"/>
+          <a:stretch>
+            <a:fillRect/>
+          </a:stretch>
+        </p:blipFill>
+        <p:spPr>
+          <a:xfrm>
+            <a:off x="706249" y="4709741"/>
+            <a:ext cx="719425" cy="719425"/>
+          </a:xfrm>
+          <a:prstGeom prst="rect">
+            <a:avLst/>
+          </a:prstGeom>
+        </p:spPr>
+      </p:pic>
+      <p:sp>
+        <p:nvSpPr>
+          <p:cNvPr id="5" name="正方形/長方形 4">
+            <a:extLst>
+              <a:ext uri="{FF2B5EF4-FFF2-40B4-BE49-F238E27FC236}">
+                <a16:creationId xmlns:a16="http://schemas.microsoft.com/office/drawing/2014/main" id="{7450CD67-E298-804E-AF3A-1701AE1E42E1}"/>
+              </a:ext>
+            </a:extLst>
+          </p:cNvPr>
+          <p:cNvSpPr/>
+          <p:nvPr/>
+        </p:nvSpPr>
+        <p:spPr>
+          <a:xfrm>
+            <a:off x="1710267" y="1698440"/>
+            <a:ext cx="9804400" cy="4401205"/>
+          </a:xfrm>
+          <a:prstGeom prst="rect">
+            <a:avLst/>
+          </a:prstGeom>
+        </p:spPr>
+        <p:txBody>
+          <a:bodyPr wrap="square">
             <a:spAutoFit/>
           </a:bodyPr>
           <a:lstStyle/>
           <a:p>
             <a:r>
-              <a:rPr kumimoji="1" lang="en-US" altLang="ja-JP" sz="3600" dirty="0"/>
-              <a:t>&gt;</a:t>
-            </a:r>
-            <a:r>
-              <a:rPr kumimoji="1" lang="en-US" altLang="ja-JP" sz="3600" dirty="0" err="1"/>
-              <a:t>my_help</a:t>
-            </a:r>
-            <a:r>
-              <a:rPr kumimoji="1" lang="en-US" altLang="ja-JP" sz="3600" dirty="0"/>
-              <a:t> list emacs </a:t>
-            </a:r>
-          </a:p>
-          <a:p>
-            <a:endParaRPr kumimoji="1" lang="en-US" altLang="ja-JP" sz="3600" dirty="0"/>
-          </a:p>
-          <a:p>
-            <a:r>
-              <a:rPr kumimoji="1" lang="en-US" altLang="ja-JP" sz="3600" dirty="0"/>
-              <a:t>emacs</a:t>
-            </a:r>
-            <a:r>
-              <a:rPr kumimoji="1" lang="ja-JP" altLang="en-US" sz="3600"/>
-              <a:t>の</a:t>
-            </a:r>
-            <a:r>
-              <a:rPr kumimoji="1" lang="en-US" altLang="ja-JP" sz="3600" dirty="0"/>
-              <a:t>command</a:t>
-            </a:r>
-            <a:r>
-              <a:rPr kumimoji="1" lang="ja-JP" altLang="en-US" sz="3600"/>
-              <a:t>の</a:t>
-            </a:r>
-            <a:r>
-              <a:rPr kumimoji="1" lang="en-US" altLang="ja-JP" sz="3600" dirty="0"/>
-              <a:t>help</a:t>
-            </a:r>
-            <a:r>
-              <a:rPr kumimoji="1" lang="ja-JP" altLang="en-US" sz="3600"/>
-              <a:t>がリスト表示される．</a:t>
-            </a:r>
+              <a:rPr kumimoji="1" lang="en-US" altLang="ja-JP" sz="4000" dirty="0"/>
+              <a:t>Terminal</a:t>
+            </a:r>
+            <a:r>
+              <a:rPr kumimoji="1" lang="ja-JP" altLang="en-US" sz="4000"/>
+              <a:t>上で開くことができる．</a:t>
+            </a:r>
+            <a:endParaRPr kumimoji="1" lang="en-US" altLang="ja-JP" sz="4000" dirty="0"/>
+          </a:p>
+          <a:p>
+            <a:endParaRPr kumimoji="1" lang="en-US" altLang="ja-JP" sz="4000" dirty="0"/>
+          </a:p>
+          <a:p>
+            <a:r>
+              <a:rPr kumimoji="1" lang="ja-JP" altLang="en-US" sz="4000"/>
+              <a:t>同じディレクトリにいなくても追加，編集，削除ができる．</a:t>
+            </a:r>
+          </a:p>
+          <a:p>
+            <a:endParaRPr kumimoji="1" lang="en-US" altLang="ja-JP" sz="4000" dirty="0"/>
+          </a:p>
+          <a:p>
+            <a:r>
+              <a:rPr kumimoji="1" lang="ja-JP" altLang="en-US" sz="4000"/>
+              <a:t>メモを残したファイルがどこにあるか探す手間が省ける．</a:t>
+            </a:r>
+            <a:endParaRPr kumimoji="1" lang="en-US" altLang="ja-JP" sz="4000" dirty="0"/>
           </a:p>
         </p:txBody>
       </p:sp>
     </p:spTree>
     <p:extLst>
       <p:ext uri="{BB962C8B-B14F-4D97-AF65-F5344CB8AC3E}">
-        <p14:creationId xmlns:p14="http://schemas.microsoft.com/office/powerpoint/2010/main" val="3066698743"/>
+        <p14:creationId xmlns:p14="http://schemas.microsoft.com/office/powerpoint/2010/main" val="735426547"/>
       </p:ext>
     </p:extLst>
   </p:cSld>
@@ -4688,92 +6264,12 @@
           </a:p>
         </p:txBody>
       </p:sp>
-      <p:sp>
-        <p:nvSpPr>
-          <p:cNvPr id="6" name="テキスト ボックス 5">
-            <a:extLst>
-              <a:ext uri="{FF2B5EF4-FFF2-40B4-BE49-F238E27FC236}">
-                <a16:creationId xmlns:a16="http://schemas.microsoft.com/office/drawing/2014/main" id="{4EE341B6-0457-C646-96F1-55F43A0B58F4}"/>
-              </a:ext>
-            </a:extLst>
-          </p:cNvPr>
-          <p:cNvSpPr txBox="1"/>
-          <p:nvPr/>
-        </p:nvSpPr>
-        <p:spPr>
-          <a:xfrm>
-            <a:off x="6726476" y="2595480"/>
-            <a:ext cx="5465524" cy="2862322"/>
-          </a:xfrm>
-          <a:prstGeom prst="rect">
-            <a:avLst/>
-          </a:prstGeom>
-          <a:noFill/>
-        </p:spPr>
-        <p:txBody>
-          <a:bodyPr wrap="square" rtlCol="0">
-            <a:spAutoFit/>
-          </a:bodyPr>
-          <a:lstStyle/>
-          <a:p>
-            <a:r>
-              <a:rPr kumimoji="1" lang="en-US" altLang="ja-JP" sz="3600" dirty="0"/>
-              <a:t>&gt;</a:t>
-            </a:r>
-            <a:r>
-              <a:rPr kumimoji="1" lang="en-US" altLang="ja-JP" sz="3600" dirty="0" err="1"/>
-              <a:t>my_help</a:t>
-            </a:r>
-            <a:r>
-              <a:rPr kumimoji="1" lang="en-US" altLang="ja-JP" sz="3600" dirty="0"/>
-              <a:t> list emacs</a:t>
-            </a:r>
-            <a:r>
-              <a:rPr kumimoji="1" lang="ja-JP" altLang="en-US" sz="3600"/>
-              <a:t> </a:t>
-            </a:r>
-            <a:r>
-              <a:rPr kumimoji="1" lang="en-US" altLang="ja-JP" sz="3600" dirty="0"/>
-              <a:t>-w </a:t>
-            </a:r>
-          </a:p>
-          <a:p>
-            <a:endParaRPr kumimoji="1" lang="en-US" altLang="ja-JP" sz="3600" dirty="0"/>
-          </a:p>
-          <a:p>
-            <a:r>
-              <a:rPr kumimoji="1" lang="en-US" altLang="ja-JP" sz="3600" dirty="0"/>
-              <a:t>emacs</a:t>
-            </a:r>
-            <a:r>
-              <a:rPr kumimoji="1" lang="ja-JP" altLang="en-US" sz="3600"/>
-              <a:t>の</a:t>
-            </a:r>
-            <a:r>
-              <a:rPr kumimoji="1" lang="en-US" altLang="ja-JP" sz="3600" dirty="0"/>
-              <a:t>window</a:t>
-            </a:r>
-            <a:r>
-              <a:rPr kumimoji="1" lang="ja-JP" altLang="en-US" sz="3600"/>
-              <a:t>についての</a:t>
-            </a:r>
-            <a:r>
-              <a:rPr kumimoji="1" lang="en-US" altLang="ja-JP" sz="3600" dirty="0"/>
-              <a:t>help</a:t>
-            </a:r>
-            <a:r>
-              <a:rPr kumimoji="1" lang="ja-JP" altLang="en-US" sz="3600"/>
-              <a:t>がリスト表示される．</a:t>
-            </a:r>
-          </a:p>
-        </p:txBody>
-      </p:sp>
       <p:pic>
         <p:nvPicPr>
-          <p:cNvPr id="4" name="図 3">
-            <a:extLst>
-              <a:ext uri="{FF2B5EF4-FFF2-40B4-BE49-F238E27FC236}">
-                <a16:creationId xmlns:a16="http://schemas.microsoft.com/office/drawing/2014/main" id="{91A85033-A10D-B04D-9086-AE64F029B544}"/>
+          <p:cNvPr id="5" name="図 4">
+            <a:extLst>
+              <a:ext uri="{FF2B5EF4-FFF2-40B4-BE49-F238E27FC236}">
+                <a16:creationId xmlns:a16="http://schemas.microsoft.com/office/drawing/2014/main" id="{B6B5FFD5-F7F5-224E-A716-C6BBAB1EC885}"/>
               </a:ext>
             </a:extLst>
           </p:cNvPr>
@@ -4790,18 +6286,90 @@
         </p:blipFill>
         <p:spPr>
           <a:xfrm>
-            <a:off x="-204080" y="1443969"/>
-            <a:ext cx="7343915" cy="5291088"/>
+            <a:off x="-279234" y="1548863"/>
+            <a:ext cx="7368966" cy="5309137"/>
           </a:xfrm>
           <a:prstGeom prst="rect">
             <a:avLst/>
           </a:prstGeom>
         </p:spPr>
       </p:pic>
+      <p:sp>
+        <p:nvSpPr>
+          <p:cNvPr id="6" name="テキスト ボックス 5">
+            <a:extLst>
+              <a:ext uri="{FF2B5EF4-FFF2-40B4-BE49-F238E27FC236}">
+                <a16:creationId xmlns:a16="http://schemas.microsoft.com/office/drawing/2014/main" id="{4EE341B6-0457-C646-96F1-55F43A0B58F4}"/>
+              </a:ext>
+            </a:extLst>
+          </p:cNvPr>
+          <p:cNvSpPr txBox="1"/>
+          <p:nvPr/>
+        </p:nvSpPr>
+        <p:spPr>
+          <a:xfrm>
+            <a:off x="6789107" y="2601050"/>
+            <a:ext cx="4977008" cy="2862322"/>
+          </a:xfrm>
+          <a:prstGeom prst="rect">
+            <a:avLst/>
+          </a:prstGeom>
+          <a:noFill/>
+        </p:spPr>
+        <p:txBody>
+          <a:bodyPr wrap="square" rtlCol="0">
+            <a:spAutoFit/>
+          </a:bodyPr>
+          <a:lstStyle/>
+          <a:p>
+            <a:r>
+              <a:rPr kumimoji="1" lang="en-US" altLang="ja-JP" sz="3600" dirty="0"/>
+              <a:t>&gt;</a:t>
+            </a:r>
+            <a:r>
+              <a:rPr kumimoji="1" lang="en-US" altLang="ja-JP" sz="3600" dirty="0" err="1"/>
+              <a:t>my_help</a:t>
+            </a:r>
+            <a:r>
+              <a:rPr kumimoji="1" lang="en-US" altLang="ja-JP" sz="3600" dirty="0"/>
+              <a:t> list emacs </a:t>
+            </a:r>
+          </a:p>
+          <a:p>
+            <a:endParaRPr kumimoji="1" lang="en-US" altLang="ja-JP" sz="3600" dirty="0"/>
+          </a:p>
+          <a:p>
+            <a:r>
+              <a:rPr kumimoji="1" lang="en-US" altLang="ja-JP" sz="3600" dirty="0"/>
+              <a:t>emacs</a:t>
+            </a:r>
+            <a:r>
+              <a:rPr kumimoji="1" lang="ja-JP" altLang="en-US" sz="3600"/>
+              <a:t>の</a:t>
+            </a:r>
+            <a:r>
+              <a:rPr kumimoji="1" lang="en-US" altLang="ja-JP" sz="3600" dirty="0"/>
+              <a:t>command</a:t>
+            </a:r>
+            <a:r>
+              <a:rPr kumimoji="1" lang="ja-JP" altLang="en-US" sz="3600"/>
+              <a:t>の</a:t>
+            </a:r>
+            <a:r>
+              <a:rPr kumimoji="1" lang="en-US" altLang="ja-JP" sz="3600" dirty="0"/>
+              <a:t>help</a:t>
+            </a:r>
+            <a:r>
+              <a:rPr kumimoji="1" lang="ja-JP" altLang="en-US" sz="3600"/>
+              <a:t>がリスト表示される．</a:t>
+            </a:r>
+          </a:p>
+        </p:txBody>
+      </p:sp>
     </p:spTree>
     <p:extLst>
       <p:ext uri="{BB962C8B-B14F-4D97-AF65-F5344CB8AC3E}">
-        <p14:creationId xmlns:p14="http://schemas.microsoft.com/office/powerpoint/2010/main" val="2861018704"/>
+        <p14:creationId xmlns:p14="http://schemas.microsoft.com/office/powerpoint/2010/main" val="3066698743"/>
       </p:ext>
     </p:extLst>
   </p:cSld>
@@ -4833,7 +6401,7 @@
           <p:cNvPr id="2" name="テキスト ボックス 1">
             <a:extLst>
               <a:ext uri="{FF2B5EF4-FFF2-40B4-BE49-F238E27FC236}">
-                <a16:creationId xmlns:a16="http://schemas.microsoft.com/office/drawing/2014/main" id="{C57537C2-2200-8F48-9F24-E44643990A24}"/>
+                <a16:creationId xmlns:a16="http://schemas.microsoft.com/office/drawing/2014/main" id="{2304BA78-B549-BD40-8EB3-F19E35CDE63A}"/>
               </a:ext>
             </a:extLst>
           </p:cNvPr>
@@ -4842,7 +6410,318 @@
         </p:nvSpPr>
         <p:spPr>
           <a:xfrm>
-            <a:off x="3114260" y="117139"/>
+            <a:off x="2190916" y="331513"/>
+            <a:ext cx="7867483" cy="769441"/>
+          </a:xfrm>
+          <a:prstGeom prst="rect">
+            <a:avLst/>
+          </a:prstGeom>
+          <a:noFill/>
+        </p:spPr>
+        <p:txBody>
+          <a:bodyPr wrap="square" rtlCol="0">
+            <a:spAutoFit/>
+          </a:bodyPr>
+          <a:lstStyle/>
+          <a:p>
+            <a:pPr algn="ctr"/>
+            <a:r>
+              <a:rPr kumimoji="1" lang="en-US" altLang="ja-JP" sz="4400" dirty="0" err="1"/>
+              <a:t>my_help</a:t>
+            </a:r>
+            <a:r>
+              <a:rPr kumimoji="1" lang="ja-JP" altLang="en-US" sz="4400"/>
+              <a:t>の振る舞い</a:t>
+            </a:r>
+          </a:p>
+        </p:txBody>
+      </p:sp>
+      <p:sp>
+        <p:nvSpPr>
+          <p:cNvPr id="6" name="テキスト ボックス 5">
+            <a:extLst>
+              <a:ext uri="{FF2B5EF4-FFF2-40B4-BE49-F238E27FC236}">
+                <a16:creationId xmlns:a16="http://schemas.microsoft.com/office/drawing/2014/main" id="{4EE341B6-0457-C646-96F1-55F43A0B58F4}"/>
+              </a:ext>
+            </a:extLst>
+          </p:cNvPr>
+          <p:cNvSpPr txBox="1"/>
+          <p:nvPr/>
+        </p:nvSpPr>
+        <p:spPr>
+          <a:xfrm>
+            <a:off x="6726476" y="2595480"/>
+            <a:ext cx="5465524" cy="2862322"/>
+          </a:xfrm>
+          <a:prstGeom prst="rect">
+            <a:avLst/>
+          </a:prstGeom>
+          <a:noFill/>
+        </p:spPr>
+        <p:txBody>
+          <a:bodyPr wrap="square" rtlCol="0">
+            <a:spAutoFit/>
+          </a:bodyPr>
+          <a:lstStyle/>
+          <a:p>
+            <a:r>
+              <a:rPr kumimoji="1" lang="en-US" altLang="ja-JP" sz="3600" dirty="0"/>
+              <a:t>&gt;</a:t>
+            </a:r>
+            <a:r>
+              <a:rPr kumimoji="1" lang="en-US" altLang="ja-JP" sz="3600" dirty="0" err="1"/>
+              <a:t>my_help</a:t>
+            </a:r>
+            <a:r>
+              <a:rPr kumimoji="1" lang="en-US" altLang="ja-JP" sz="3600" dirty="0"/>
+              <a:t> list emacs</a:t>
+            </a:r>
+            <a:r>
+              <a:rPr kumimoji="1" lang="ja-JP" altLang="en-US" sz="3600"/>
+              <a:t> </a:t>
+            </a:r>
+            <a:r>
+              <a:rPr kumimoji="1" lang="en-US" altLang="ja-JP" sz="3600" dirty="0"/>
+              <a:t>-w </a:t>
+            </a:r>
+          </a:p>
+          <a:p>
+            <a:endParaRPr kumimoji="1" lang="en-US" altLang="ja-JP" sz="3600" dirty="0"/>
+          </a:p>
+          <a:p>
+            <a:r>
+              <a:rPr kumimoji="1" lang="en-US" altLang="ja-JP" sz="3600" dirty="0"/>
+              <a:t>emacs</a:t>
+            </a:r>
+            <a:r>
+              <a:rPr kumimoji="1" lang="ja-JP" altLang="en-US" sz="3600"/>
+              <a:t>の</a:t>
+            </a:r>
+            <a:r>
+              <a:rPr kumimoji="1" lang="en-US" altLang="ja-JP" sz="3600" dirty="0"/>
+              <a:t>window</a:t>
+            </a:r>
+            <a:r>
+              <a:rPr kumimoji="1" lang="ja-JP" altLang="en-US" sz="3600"/>
+              <a:t>についての</a:t>
+            </a:r>
+            <a:r>
+              <a:rPr kumimoji="1" lang="en-US" altLang="ja-JP" sz="3600" dirty="0"/>
+              <a:t>help</a:t>
+            </a:r>
+            <a:r>
+              <a:rPr kumimoji="1" lang="ja-JP" altLang="en-US" sz="3600"/>
+              <a:t>がリスト表示される．</a:t>
+            </a:r>
+          </a:p>
+        </p:txBody>
+      </p:sp>
+      <p:pic>
+        <p:nvPicPr>
+          <p:cNvPr id="4" name="図 3">
+            <a:extLst>
+              <a:ext uri="{FF2B5EF4-FFF2-40B4-BE49-F238E27FC236}">
+                <a16:creationId xmlns:a16="http://schemas.microsoft.com/office/drawing/2014/main" id="{91A85033-A10D-B04D-9086-AE64F029B544}"/>
+              </a:ext>
+            </a:extLst>
+          </p:cNvPr>
+          <p:cNvPicPr>
+            <a:picLocks noChangeAspect="1"/>
+          </p:cNvPicPr>
+          <p:nvPr/>
+        </p:nvPicPr>
+        <p:blipFill>
+          <a:blip r:embed="rId2"/>
+          <a:stretch>
+            <a:fillRect/>
+          </a:stretch>
+        </p:blipFill>
+        <p:spPr>
+          <a:xfrm>
+            <a:off x="-204080" y="1566912"/>
+            <a:ext cx="7343915" cy="5291088"/>
+          </a:xfrm>
+          <a:prstGeom prst="rect">
+            <a:avLst/>
+          </a:prstGeom>
+        </p:spPr>
+      </p:pic>
+    </p:spTree>
+    <p:extLst>
+      <p:ext uri="{BB962C8B-B14F-4D97-AF65-F5344CB8AC3E}">
+        <p14:creationId xmlns:p14="http://schemas.microsoft.com/office/powerpoint/2010/main" val="2861018704"/>
+      </p:ext>
+    </p:extLst>
+  </p:cSld>
+  <p:clrMapOvr>
+    <a:masterClrMapping/>
+  </p:clrMapOvr>
+</p:sld>
+</file>
+
+<file path=ppt/slides/slide8.xml><?xml version="1.0" encoding="utf-8"?>
+<p:sld xmlns:a="http://schemas.openxmlformats.org/drawingml/2006/main" xmlns:r="http://schemas.openxmlformats.org/officeDocument/2006/relationships" xmlns:p="http://schemas.openxmlformats.org/presentationml/2006/main">
+  <p:cSld>
+    <p:spTree>
+      <p:nvGrpSpPr>
+        <p:cNvPr id="1" name=""/>
+        <p:cNvGrpSpPr/>
+        <p:nvPr/>
+      </p:nvGrpSpPr>
+      <p:grpSpPr>
+        <a:xfrm>
+          <a:off x="0" y="0"/>
+          <a:ext cx="0" cy="0"/>
+          <a:chOff x="0" y="0"/>
+          <a:chExt cx="0" cy="0"/>
+        </a:xfrm>
+      </p:grpSpPr>
+      <p:sp>
+        <p:nvSpPr>
+          <p:cNvPr id="4" name="正方形/長方形 3">
+            <a:extLst>
+              <a:ext uri="{FF2B5EF4-FFF2-40B4-BE49-F238E27FC236}">
+                <a16:creationId xmlns:a16="http://schemas.microsoft.com/office/drawing/2014/main" id="{FB667DFE-F7E3-1C4A-8257-6454E3AC8166}"/>
+              </a:ext>
+            </a:extLst>
+          </p:cNvPr>
+          <p:cNvSpPr/>
+          <p:nvPr/>
+        </p:nvSpPr>
+        <p:spPr>
+          <a:xfrm>
+            <a:off x="2895599" y="3954929"/>
+            <a:ext cx="8448261" cy="1323439"/>
+          </a:xfrm>
+          <a:prstGeom prst="rect">
+            <a:avLst/>
+          </a:prstGeom>
+        </p:spPr>
+        <p:txBody>
+          <a:bodyPr wrap="square">
+            <a:spAutoFit/>
+          </a:bodyPr>
+          <a:lstStyle/>
+          <a:p>
+            <a:r>
+              <a:rPr kumimoji="1" lang="ja-JP" altLang="en-US" sz="4000"/>
+              <a:t>より効率的な知識の習得方法として，</a:t>
+            </a:r>
+            <a:r>
+              <a:rPr kumimoji="1" lang="en-US" altLang="ja-JP" sz="4000" dirty="0"/>
+              <a:t>AM/PM</a:t>
+            </a:r>
+            <a:r>
+              <a:rPr kumimoji="1" lang="ja-JP" altLang="en-US" sz="4000"/>
+              <a:t>という考え方がある．</a:t>
+            </a:r>
+          </a:p>
+        </p:txBody>
+      </p:sp>
+      <p:sp>
+        <p:nvSpPr>
+          <p:cNvPr id="5" name="テキスト ボックス 4">
+            <a:extLst>
+              <a:ext uri="{FF2B5EF4-FFF2-40B4-BE49-F238E27FC236}">
+                <a16:creationId xmlns:a16="http://schemas.microsoft.com/office/drawing/2014/main" id="{AAE834C2-6206-AE47-A629-BD8C34FA8775}"/>
+              </a:ext>
+            </a:extLst>
+          </p:cNvPr>
+          <p:cNvSpPr txBox="1"/>
+          <p:nvPr/>
+        </p:nvSpPr>
+        <p:spPr>
+          <a:xfrm>
+            <a:off x="1888434" y="1753153"/>
+            <a:ext cx="8647043" cy="707886"/>
+          </a:xfrm>
+          <a:prstGeom prst="rect">
+            <a:avLst/>
+          </a:prstGeom>
+          <a:noFill/>
+        </p:spPr>
+        <p:txBody>
+          <a:bodyPr wrap="square" rtlCol="0">
+            <a:spAutoFit/>
+          </a:bodyPr>
+          <a:lstStyle/>
+          <a:p>
+            <a:r>
+              <a:rPr kumimoji="1" lang="en-US" altLang="ja-JP" sz="4000" dirty="0" err="1"/>
+              <a:t>my_help</a:t>
+            </a:r>
+            <a:r>
+              <a:rPr kumimoji="1" lang="ja-JP" altLang="en-US" sz="4000"/>
+              <a:t>は自身の知識を残すだけ．</a:t>
+            </a:r>
+            <a:endParaRPr kumimoji="1" lang="en-US" altLang="ja-JP" sz="4000" dirty="0"/>
+          </a:p>
+        </p:txBody>
+      </p:sp>
+      <p:sp>
+        <p:nvSpPr>
+          <p:cNvPr id="6" name="右矢印 5">
+            <a:extLst>
+              <a:ext uri="{FF2B5EF4-FFF2-40B4-BE49-F238E27FC236}">
+                <a16:creationId xmlns:a16="http://schemas.microsoft.com/office/drawing/2014/main" id="{0AD4FD95-B14D-AA4E-ABCE-DE685E050942}"/>
+              </a:ext>
+            </a:extLst>
+          </p:cNvPr>
+          <p:cNvSpPr/>
+          <p:nvPr/>
+        </p:nvSpPr>
+        <p:spPr>
+          <a:xfrm>
+            <a:off x="483164" y="3655911"/>
+            <a:ext cx="2092841" cy="1921476"/>
+          </a:xfrm>
+          <a:prstGeom prst="rightArrow">
+            <a:avLst/>
+          </a:prstGeom>
+          <a:solidFill>
+            <a:schemeClr val="accent1"/>
+          </a:solidFill>
+        </p:spPr>
+        <p:style>
+          <a:lnRef idx="2">
+            <a:schemeClr val="accent1">
+              <a:shade val="50000"/>
+            </a:schemeClr>
+          </a:lnRef>
+          <a:fillRef idx="1">
+            <a:schemeClr val="accent1"/>
+          </a:fillRef>
+          <a:effectRef idx="0">
+            <a:schemeClr val="accent1"/>
+          </a:effectRef>
+          <a:fontRef idx="minor">
+            <a:schemeClr val="lt1"/>
+          </a:fontRef>
+        </p:style>
+        <p:txBody>
+          <a:bodyPr rtlCol="0" anchor="ctr"/>
+          <a:lstStyle/>
+          <a:p>
+            <a:pPr algn="ctr"/>
+            <a:endParaRPr kumimoji="1" lang="ja-JP" altLang="en-US"/>
+          </a:p>
+        </p:txBody>
+      </p:sp>
+      <p:sp>
+        <p:nvSpPr>
+          <p:cNvPr id="7" name="テキスト ボックス 6">
+            <a:extLst>
+              <a:ext uri="{FF2B5EF4-FFF2-40B4-BE49-F238E27FC236}">
+                <a16:creationId xmlns:a16="http://schemas.microsoft.com/office/drawing/2014/main" id="{C73A4624-DA89-0B4A-A4B1-5ADB24551DFB}"/>
+              </a:ext>
+            </a:extLst>
+          </p:cNvPr>
+          <p:cNvSpPr txBox="1"/>
+          <p:nvPr/>
+        </p:nvSpPr>
+        <p:spPr>
+          <a:xfrm>
+            <a:off x="3173895" y="558281"/>
             <a:ext cx="5658679" cy="769441"/>
           </a:xfrm>
           <a:prstGeom prst="rect">
@@ -4868,12 +6747,42 @@
           </a:p>
         </p:txBody>
       </p:sp>
-      <p:sp>
-        <p:nvSpPr>
-          <p:cNvPr id="3" name="テキスト ボックス 2">
-            <a:extLst>
-              <a:ext uri="{FF2B5EF4-FFF2-40B4-BE49-F238E27FC236}">
-                <a16:creationId xmlns:a16="http://schemas.microsoft.com/office/drawing/2014/main" id="{BC854CCB-53E9-9B4A-B61C-ECF53805A638}"/>
+    </p:spTree>
+    <p:extLst>
+      <p:ext uri="{BB962C8B-B14F-4D97-AF65-F5344CB8AC3E}">
+        <p14:creationId xmlns:p14="http://schemas.microsoft.com/office/powerpoint/2010/main" val="3813398015"/>
+      </p:ext>
+    </p:extLst>
+  </p:cSld>
+  <p:clrMapOvr>
+    <a:masterClrMapping/>
+  </p:clrMapOvr>
+</p:sld>
+</file>
+
+<file path=ppt/slides/slide9.xml><?xml version="1.0" encoding="utf-8"?>
+<p:sld xmlns:a="http://schemas.openxmlformats.org/drawingml/2006/main" xmlns:r="http://schemas.openxmlformats.org/officeDocument/2006/relationships" xmlns:p="http://schemas.openxmlformats.org/presentationml/2006/main">
+  <p:cSld>
+    <p:spTree>
+      <p:nvGrpSpPr>
+        <p:cNvPr id="1" name=""/>
+        <p:cNvGrpSpPr/>
+        <p:nvPr/>
+      </p:nvGrpSpPr>
+      <p:grpSpPr>
+        <a:xfrm>
+          <a:off x="0" y="0"/>
+          <a:ext cx="0" cy="0"/>
+          <a:chOff x="0" y="0"/>
+          <a:chExt cx="0" cy="0"/>
+        </a:xfrm>
+      </p:grpSpPr>
+      <p:sp>
+        <p:nvSpPr>
+          <p:cNvPr id="2" name="テキスト ボックス 1">
+            <a:extLst>
+              <a:ext uri="{FF2B5EF4-FFF2-40B4-BE49-F238E27FC236}">
+                <a16:creationId xmlns:a16="http://schemas.microsoft.com/office/drawing/2014/main" id="{C57537C2-2200-8F48-9F24-E44643990A24}"/>
               </a:ext>
             </a:extLst>
           </p:cNvPr>
@@ -4882,8 +6791,8 @@
         </p:nvSpPr>
         <p:spPr>
           <a:xfrm>
-            <a:off x="728871" y="1007314"/>
-            <a:ext cx="10694504" cy="1200329"/>
+            <a:off x="3167266" y="614095"/>
+            <a:ext cx="5658679" cy="769441"/>
           </a:xfrm>
           <a:prstGeom prst="rect">
             <a:avLst/>
@@ -4896,17 +6805,14 @@
           </a:bodyPr>
           <a:lstStyle/>
           <a:p>
-            <a:r>
-              <a:rPr kumimoji="1" lang="ja-JP" altLang="en-US" sz="3600"/>
-              <a:t>より効率的な知識の習得方法として，</a:t>
-            </a:r>
-            <a:r>
-              <a:rPr kumimoji="1" lang="en-US" altLang="ja-JP" sz="3600" dirty="0"/>
-              <a:t>AM/PM</a:t>
-            </a:r>
-            <a:r>
-              <a:rPr kumimoji="1" lang="ja-JP" altLang="en-US" sz="3600"/>
-              <a:t>という考え方がある．</a:t>
+            <a:pPr algn="ctr"/>
+            <a:r>
+              <a:rPr kumimoji="1" lang="en-US" altLang="ja-JP" sz="4400" dirty="0" err="1"/>
+              <a:t>my_help</a:t>
+            </a:r>
+            <a:r>
+              <a:rPr kumimoji="1" lang="ja-JP" altLang="en-US" sz="4400"/>
+              <a:t>課題</a:t>
             </a:r>
           </a:p>
         </p:txBody>
@@ -4925,8 +6831,8 @@
         </p:nvSpPr>
         <p:spPr>
           <a:xfrm>
-            <a:off x="304801" y="2449109"/>
-            <a:ext cx="5777948" cy="3949148"/>
+            <a:off x="218657" y="2007705"/>
+            <a:ext cx="5777948" cy="4536325"/>
           </a:xfrm>
           <a:prstGeom prst="roundRect">
             <a:avLst/>
@@ -5000,7 +6906,15 @@
             </a:endParaRPr>
           </a:p>
           <a:p>
-            <a:endParaRPr kumimoji="1" lang="en-US" altLang="ja-JP" sz="1200" dirty="0">
+            <a:r>
+              <a:rPr kumimoji="1" lang="ja-JP" altLang="en-US" sz="3200">
+                <a:solidFill>
+                  <a:schemeClr val="tx1"/>
+                </a:solidFill>
+              </a:rPr>
+              <a:t>テキストなどから知識を得る．</a:t>
+            </a:r>
+            <a:endParaRPr kumimoji="1" lang="en-US" altLang="ja-JP" sz="3200" dirty="0">
               <a:solidFill>
                 <a:schemeClr val="tx1"/>
               </a:solidFill>
@@ -5039,14 +6953,14 @@
         </p:nvSpPr>
         <p:spPr>
           <a:xfrm>
-            <a:off x="6175513" y="2449109"/>
-            <a:ext cx="5777948" cy="3949148"/>
+            <a:off x="5996605" y="2007705"/>
+            <a:ext cx="6016489" cy="4536326"/>
           </a:xfrm>
           <a:prstGeom prst="roundRect">
             <a:avLst/>
           </a:prstGeom>
           <a:solidFill>
-            <a:schemeClr val="accent4">
+            <a:schemeClr val="accent2">
               <a:lumMod val="60000"/>
               <a:lumOff val="40000"/>
             </a:schemeClr>
@@ -5099,6 +7013,13 @@
             </a:endParaRPr>
           </a:p>
           <a:p>
+            <a:endParaRPr lang="en-US" altLang="ja-JP" sz="1200" dirty="0">
+              <a:solidFill>
+                <a:schemeClr val="tx1"/>
+              </a:solidFill>
+            </a:endParaRPr>
+          </a:p>
+          <a:p>
             <a:r>
               <a:rPr lang="ja-JP" altLang="en-US" sz="3200">
                 <a:solidFill>
@@ -5114,6 +7035,21 @@
             </a:endParaRPr>
           </a:p>
           <a:p>
+            <a:r>
+              <a:rPr lang="ja-JP" altLang="en-US" sz="3200">
+                <a:solidFill>
+                  <a:schemeClr val="tx1"/>
+                </a:solidFill>
+              </a:rPr>
+              <a:t>学会活動も学習の一部．</a:t>
+            </a:r>
+            <a:endParaRPr lang="en-US" altLang="ja-JP" sz="3200" dirty="0">
+              <a:solidFill>
+                <a:schemeClr val="tx1"/>
+              </a:solidFill>
+            </a:endParaRPr>
+          </a:p>
+          <a:p>
             <a:endParaRPr lang="en-US" altLang="ja-JP" sz="1200" dirty="0">
               <a:solidFill>
                 <a:schemeClr val="tx1"/>
@@ -5148,413 +7084,6 @@
     <p:extLst>
       <p:ext uri="{BB962C8B-B14F-4D97-AF65-F5344CB8AC3E}">
         <p14:creationId xmlns:p14="http://schemas.microsoft.com/office/powerpoint/2010/main" val="3441153636"/>
-      </p:ext>
-    </p:extLst>
-  </p:cSld>
-  <p:clrMapOvr>
-    <a:masterClrMapping/>
-  </p:clrMapOvr>
-</p:sld>
-</file>
-
-<file path=ppt/slides/slide8.xml><?xml version="1.0" encoding="utf-8"?>
-<p:sld xmlns:a="http://schemas.openxmlformats.org/drawingml/2006/main" xmlns:r="http://schemas.openxmlformats.org/officeDocument/2006/relationships" xmlns:p="http://schemas.openxmlformats.org/presentationml/2006/main">
-  <p:cSld>
-    <p:spTree>
-      <p:nvGrpSpPr>
-        <p:cNvPr id="1" name=""/>
-        <p:cNvGrpSpPr/>
-        <p:nvPr/>
-      </p:nvGrpSpPr>
-      <p:grpSpPr>
-        <a:xfrm>
-          <a:off x="0" y="0"/>
-          <a:ext cx="0" cy="0"/>
-          <a:chOff x="0" y="0"/>
-          <a:chExt cx="0" cy="0"/>
-        </a:xfrm>
-      </p:grpSpPr>
-      <p:sp>
-        <p:nvSpPr>
-          <p:cNvPr id="2" name="テキスト ボックス 1">
-            <a:extLst>
-              <a:ext uri="{FF2B5EF4-FFF2-40B4-BE49-F238E27FC236}">
-                <a16:creationId xmlns:a16="http://schemas.microsoft.com/office/drawing/2014/main" id="{70781E77-2F6B-C740-B5FE-4CF20DC9AE02}"/>
-              </a:ext>
-            </a:extLst>
-          </p:cNvPr>
-          <p:cNvSpPr txBox="1"/>
-          <p:nvPr/>
-        </p:nvSpPr>
-        <p:spPr>
-          <a:xfrm>
-            <a:off x="2676788" y="373711"/>
-            <a:ext cx="7169727" cy="769441"/>
-          </a:xfrm>
-          <a:prstGeom prst="rect">
-            <a:avLst/>
-          </a:prstGeom>
-          <a:noFill/>
-        </p:spPr>
-        <p:txBody>
-          <a:bodyPr wrap="square" rtlCol="0">
-            <a:spAutoFit/>
-          </a:bodyPr>
-          <a:lstStyle/>
-          <a:p>
-            <a:pPr algn="ctr"/>
-            <a:r>
-              <a:rPr kumimoji="1" lang="ja-JP" altLang="en-US" sz="4400"/>
-              <a:t>開発目標</a:t>
-            </a:r>
-          </a:p>
-        </p:txBody>
-      </p:sp>
-      <p:sp>
-        <p:nvSpPr>
-          <p:cNvPr id="3" name="テキスト ボックス 2">
-            <a:extLst>
-              <a:ext uri="{FF2B5EF4-FFF2-40B4-BE49-F238E27FC236}">
-                <a16:creationId xmlns:a16="http://schemas.microsoft.com/office/drawing/2014/main" id="{6A83FB72-7E91-3449-913B-1789742662B0}"/>
-              </a:ext>
-            </a:extLst>
-          </p:cNvPr>
-          <p:cNvSpPr txBox="1"/>
-          <p:nvPr/>
-        </p:nvSpPr>
-        <p:spPr>
-          <a:xfrm>
-            <a:off x="1732861" y="3012322"/>
-            <a:ext cx="6598228" cy="707886"/>
-          </a:xfrm>
-          <a:prstGeom prst="rect">
-            <a:avLst/>
-          </a:prstGeom>
-          <a:noFill/>
-        </p:spPr>
-        <p:txBody>
-          <a:bodyPr wrap="square" rtlCol="0">
-            <a:spAutoFit/>
-          </a:bodyPr>
-          <a:lstStyle/>
-          <a:p>
-            <a:r>
-              <a:rPr kumimoji="1" lang="en-US" altLang="ja-JP" sz="4000" dirty="0"/>
-              <a:t>git</a:t>
-            </a:r>
-            <a:r>
-              <a:rPr kumimoji="1" lang="ja-JP" altLang="en-US" sz="4000"/>
-              <a:t>の</a:t>
-            </a:r>
-            <a:r>
-              <a:rPr kumimoji="1" lang="en-US" altLang="ja-JP" sz="4000" dirty="0"/>
-              <a:t>repository</a:t>
-            </a:r>
-            <a:endParaRPr kumimoji="1" lang="ja-JP" altLang="en-US" sz="4000"/>
-          </a:p>
-        </p:txBody>
-      </p:sp>
-      <p:sp>
-        <p:nvSpPr>
-          <p:cNvPr id="4" name="テキスト ボックス 3">
-            <a:extLst>
-              <a:ext uri="{FF2B5EF4-FFF2-40B4-BE49-F238E27FC236}">
-                <a16:creationId xmlns:a16="http://schemas.microsoft.com/office/drawing/2014/main" id="{863DF869-A6C9-D549-9DC2-220C4DB93CCC}"/>
-              </a:ext>
-            </a:extLst>
-          </p:cNvPr>
-          <p:cNvSpPr txBox="1"/>
-          <p:nvPr/>
-        </p:nvSpPr>
-        <p:spPr>
-          <a:xfrm>
-            <a:off x="1732861" y="4095068"/>
-            <a:ext cx="5878243" cy="707886"/>
-          </a:xfrm>
-          <a:prstGeom prst="rect">
-            <a:avLst/>
-          </a:prstGeom>
-          <a:noFill/>
-        </p:spPr>
-        <p:txBody>
-          <a:bodyPr wrap="square" rtlCol="0">
-            <a:spAutoFit/>
-          </a:bodyPr>
-          <a:lstStyle/>
-          <a:p>
-            <a:r>
-              <a:rPr kumimoji="1" lang="en-US" altLang="ja-JP" sz="4000" dirty="0"/>
-              <a:t>Web</a:t>
-            </a:r>
-            <a:r>
-              <a:rPr kumimoji="1" lang="ja-JP" altLang="en-US" sz="4000"/>
-              <a:t>による表示</a:t>
-            </a:r>
-          </a:p>
-        </p:txBody>
-      </p:sp>
-      <p:sp>
-        <p:nvSpPr>
-          <p:cNvPr id="5" name="テキスト ボックス 4">
-            <a:extLst>
-              <a:ext uri="{FF2B5EF4-FFF2-40B4-BE49-F238E27FC236}">
-                <a16:creationId xmlns:a16="http://schemas.microsoft.com/office/drawing/2014/main" id="{C3117551-1FFE-A94A-9787-D48D969BD39F}"/>
-              </a:ext>
-            </a:extLst>
-          </p:cNvPr>
-          <p:cNvSpPr txBox="1"/>
-          <p:nvPr/>
-        </p:nvSpPr>
-        <p:spPr>
-          <a:xfrm>
-            <a:off x="1732861" y="5177814"/>
-            <a:ext cx="7654034" cy="707886"/>
-          </a:xfrm>
-          <a:prstGeom prst="rect">
-            <a:avLst/>
-          </a:prstGeom>
-          <a:noFill/>
-        </p:spPr>
-        <p:txBody>
-          <a:bodyPr wrap="square" rtlCol="0">
-            <a:spAutoFit/>
-          </a:bodyPr>
-          <a:lstStyle/>
-          <a:p>
-            <a:r>
-              <a:rPr kumimoji="1" lang="en-US" altLang="ja-JP" sz="4000" dirty="0"/>
-              <a:t>Point</a:t>
-            </a:r>
-            <a:r>
-              <a:rPr kumimoji="1" lang="ja-JP" altLang="en-US" sz="4000"/>
-              <a:t>付加によるラング付け</a:t>
-            </a:r>
-          </a:p>
-        </p:txBody>
-      </p:sp>
-      <p:sp>
-        <p:nvSpPr>
-          <p:cNvPr id="6" name="テキスト ボックス 5">
-            <a:extLst>
-              <a:ext uri="{FF2B5EF4-FFF2-40B4-BE49-F238E27FC236}">
-                <a16:creationId xmlns:a16="http://schemas.microsoft.com/office/drawing/2014/main" id="{F3922AC5-C6C2-A142-BCD3-C16C9AE920C6}"/>
-              </a:ext>
-            </a:extLst>
-          </p:cNvPr>
-          <p:cNvSpPr txBox="1"/>
-          <p:nvPr/>
-        </p:nvSpPr>
-        <p:spPr>
-          <a:xfrm>
-            <a:off x="622852" y="1437133"/>
-            <a:ext cx="11277600" cy="1200329"/>
-          </a:xfrm>
-          <a:prstGeom prst="rect">
-            <a:avLst/>
-          </a:prstGeom>
-          <a:noFill/>
-        </p:spPr>
-        <p:txBody>
-          <a:bodyPr wrap="square" rtlCol="0">
-            <a:spAutoFit/>
-          </a:bodyPr>
-          <a:lstStyle/>
-          <a:p>
-            <a:r>
-              <a:rPr kumimoji="1" lang="en-US" altLang="ja-JP" sz="3600" dirty="0" err="1"/>
-              <a:t>my_help</a:t>
-            </a:r>
-            <a:r>
-              <a:rPr kumimoji="1" lang="ja-JP" altLang="en-US" sz="3600"/>
-              <a:t>内の知識を共有するシステムを作成する．</a:t>
-            </a:r>
-            <a:endParaRPr kumimoji="1" lang="en-US" altLang="ja-JP" sz="3600" dirty="0"/>
-          </a:p>
-          <a:p>
-            <a:r>
-              <a:rPr kumimoji="1" lang="ja-JP" altLang="en-US" sz="3600"/>
-              <a:t>それに伴い，主に以下の</a:t>
-            </a:r>
-            <a:r>
-              <a:rPr kumimoji="1" lang="en-US" altLang="ja-JP" sz="3600" dirty="0"/>
-              <a:t>3</a:t>
-            </a:r>
-            <a:r>
-              <a:rPr kumimoji="1" lang="ja-JP" altLang="en-US" sz="3600"/>
-              <a:t>点の機能を取り入れる．</a:t>
-            </a:r>
-          </a:p>
-        </p:txBody>
-      </p:sp>
-      <p:sp>
-        <p:nvSpPr>
-          <p:cNvPr id="9" name="雲 8">
-            <a:extLst>
-              <a:ext uri="{FF2B5EF4-FFF2-40B4-BE49-F238E27FC236}">
-                <a16:creationId xmlns:a16="http://schemas.microsoft.com/office/drawing/2014/main" id="{3B0152BD-3B19-0844-8384-39B3F1B64CB3}"/>
-              </a:ext>
-            </a:extLst>
-          </p:cNvPr>
-          <p:cNvSpPr/>
-          <p:nvPr/>
-        </p:nvSpPr>
-        <p:spPr>
-          <a:xfrm>
-            <a:off x="640061" y="3005994"/>
-            <a:ext cx="902525" cy="676893"/>
-          </a:xfrm>
-          <a:prstGeom prst="cloud">
-            <a:avLst/>
-          </a:prstGeom>
-          <a:solidFill>
-            <a:schemeClr val="accent4"/>
-          </a:solidFill>
-          <a:ln>
-            <a:noFill/>
-          </a:ln>
-          <a:effectLst>
-            <a:softEdge rad="50800"/>
-          </a:effectLst>
-        </p:spPr>
-        <p:style>
-          <a:lnRef idx="2">
-            <a:schemeClr val="accent1">
-              <a:shade val="50000"/>
-            </a:schemeClr>
-          </a:lnRef>
-          <a:fillRef idx="1">
-            <a:schemeClr val="accent1"/>
-          </a:fillRef>
-          <a:effectRef idx="0">
-            <a:schemeClr val="accent1"/>
-          </a:effectRef>
-          <a:fontRef idx="minor">
-            <a:schemeClr val="lt1"/>
-          </a:fontRef>
-        </p:style>
-        <p:txBody>
-          <a:bodyPr rtlCol="0" anchor="ctr"/>
-          <a:lstStyle/>
-          <a:p>
-            <a:pPr algn="ctr"/>
-            <a:endParaRPr kumimoji="1" lang="ja-JP" altLang="en-US"/>
-          </a:p>
-        </p:txBody>
-      </p:sp>
-      <p:sp>
-        <p:nvSpPr>
-          <p:cNvPr id="10" name="雲 9">
-            <a:extLst>
-              <a:ext uri="{FF2B5EF4-FFF2-40B4-BE49-F238E27FC236}">
-                <a16:creationId xmlns:a16="http://schemas.microsoft.com/office/drawing/2014/main" id="{A0776A33-803F-ED47-BD01-8DCDFE579EA9}"/>
-              </a:ext>
-            </a:extLst>
-          </p:cNvPr>
-          <p:cNvSpPr/>
-          <p:nvPr/>
-        </p:nvSpPr>
-        <p:spPr>
-          <a:xfrm>
-            <a:off x="622851" y="4110564"/>
-            <a:ext cx="902525" cy="676893"/>
-          </a:xfrm>
-          <a:prstGeom prst="cloud">
-            <a:avLst/>
-          </a:prstGeom>
-          <a:solidFill>
-            <a:schemeClr val="accent4"/>
-          </a:solidFill>
-          <a:ln>
-            <a:noFill/>
-          </a:ln>
-          <a:effectLst>
-            <a:softEdge rad="50800"/>
-          </a:effectLst>
-        </p:spPr>
-        <p:style>
-          <a:lnRef idx="2">
-            <a:schemeClr val="accent1">
-              <a:shade val="50000"/>
-            </a:schemeClr>
-          </a:lnRef>
-          <a:fillRef idx="1">
-            <a:schemeClr val="accent1"/>
-          </a:fillRef>
-          <a:effectRef idx="0">
-            <a:schemeClr val="accent1"/>
-          </a:effectRef>
-          <a:fontRef idx="minor">
-            <a:schemeClr val="lt1"/>
-          </a:fontRef>
-        </p:style>
-        <p:txBody>
-          <a:bodyPr rtlCol="0" anchor="ctr"/>
-          <a:lstStyle/>
-          <a:p>
-            <a:pPr algn="ctr"/>
-            <a:endParaRPr kumimoji="1" lang="ja-JP" altLang="en-US"/>
-          </a:p>
-        </p:txBody>
-      </p:sp>
-      <p:sp>
-        <p:nvSpPr>
-          <p:cNvPr id="11" name="雲 10">
-            <a:extLst>
-              <a:ext uri="{FF2B5EF4-FFF2-40B4-BE49-F238E27FC236}">
-                <a16:creationId xmlns:a16="http://schemas.microsoft.com/office/drawing/2014/main" id="{4ECB4129-7048-4E4A-983E-01383A891FDC}"/>
-              </a:ext>
-            </a:extLst>
-          </p:cNvPr>
-          <p:cNvSpPr/>
-          <p:nvPr/>
-        </p:nvSpPr>
-        <p:spPr>
-          <a:xfrm>
-            <a:off x="622852" y="5208807"/>
-            <a:ext cx="902525" cy="676893"/>
-          </a:xfrm>
-          <a:prstGeom prst="cloud">
-            <a:avLst/>
-          </a:prstGeom>
-          <a:solidFill>
-            <a:schemeClr val="accent4"/>
-          </a:solidFill>
-          <a:ln>
-            <a:noFill/>
-          </a:ln>
-          <a:effectLst>
-            <a:softEdge rad="50800"/>
-          </a:effectLst>
-        </p:spPr>
-        <p:style>
-          <a:lnRef idx="2">
-            <a:schemeClr val="accent1">
-              <a:shade val="50000"/>
-            </a:schemeClr>
-          </a:lnRef>
-          <a:fillRef idx="1">
-            <a:schemeClr val="accent1"/>
-          </a:fillRef>
-          <a:effectRef idx="0">
-            <a:schemeClr val="accent1"/>
-          </a:effectRef>
-          <a:fontRef idx="minor">
-            <a:schemeClr val="lt1"/>
-          </a:fontRef>
-        </p:style>
-        <p:txBody>
-          <a:bodyPr rtlCol="0" anchor="ctr"/>
-          <a:lstStyle/>
-          <a:p>
-            <a:pPr algn="ctr"/>
-            <a:endParaRPr kumimoji="1" lang="ja-JP" altLang="en-US"/>
-          </a:p>
-        </p:txBody>
-      </p:sp>
-    </p:spTree>
-    <p:extLst>
-      <p:ext uri="{BB962C8B-B14F-4D97-AF65-F5344CB8AC3E}">
-        <p14:creationId xmlns:p14="http://schemas.microsoft.com/office/powerpoint/2010/main" val="3302818942"/>
       </p:ext>
     </p:extLst>
   </p:cSld>
@@ -5857,4 +7386,299 @@
     </a:ext>
   </a:extLst>
 </a:theme>
+</file>
+
+<file path=ppt/theme/theme2.xml><?xml version="1.0" encoding="utf-8"?>
+<a:theme xmlns:a="http://schemas.openxmlformats.org/drawingml/2006/main" name="Office テーマ">
+  <a:themeElements>
+    <a:clrScheme name="Office">
+      <a:dk1>
+        <a:sysClr val="windowText" lastClr="000000"/>
+      </a:dk1>
+      <a:lt1>
+        <a:sysClr val="window" lastClr="FFFFFF"/>
+      </a:lt1>
+      <a:dk2>
+        <a:srgbClr val="44546A"/>
+      </a:dk2>
+      <a:lt2>
+        <a:srgbClr val="E7E6E6"/>
+      </a:lt2>
+      <a:accent1>
+        <a:srgbClr val="4472C4"/>
+      </a:accent1>
+      <a:accent2>
+        <a:srgbClr val="ED7D31"/>
+      </a:accent2>
+      <a:accent3>
+        <a:srgbClr val="A5A5A5"/>
+      </a:accent3>
+      <a:accent4>
+        <a:srgbClr val="FFC000"/>
+      </a:accent4>
+      <a:accent5>
+        <a:srgbClr val="5B9BD5"/>
+      </a:accent5>
+      <a:accent6>
+        <a:srgbClr val="70AD47"/>
+      </a:accent6>
+      <a:hlink>
+        <a:srgbClr val="0563C1"/>
+      </a:hlink>
+      <a:folHlink>
+        <a:srgbClr val="954F72"/>
+      </a:folHlink>
+    </a:clrScheme>
+    <a:fontScheme name="Office">
+      <a:majorFont>
+        <a:latin typeface="游ゴシック Light" panose="020F0302020204030204"/>
+        <a:ea typeface=""/>
+        <a:cs typeface=""/>
+        <a:font script="Jpan" typeface="游ゴシック Light"/>
+        <a:font script="Hang" typeface="맑은 고딕"/>
+        <a:font script="Hans" typeface="等线 Light"/>
+        <a:font script="Hant" typeface="新細明體"/>
+        <a:font script="Arab" typeface="Times New Roman"/>
+        <a:font script="Hebr" typeface="Times New Roman"/>
+        <a:font script="Thai" typeface="Angsana New"/>
+        <a:font script="Ethi" typeface="Nyala"/>
+        <a:font script="Beng" typeface="Vrinda"/>
+        <a:font script="Gujr" typeface="Shruti"/>
+        <a:font script="Khmr" typeface="MoolBoran"/>
+        <a:font script="Knda" typeface="Tunga"/>
+        <a:font script="Guru" typeface="Raavi"/>
+        <a:font script="Cans" typeface="Euphemia"/>
+        <a:font script="Cher" typeface="Plantagenet Cherokee"/>
+        <a:font script="Yiii" typeface="Microsoft Yi Baiti"/>
+        <a:font script="Tibt" typeface="Microsoft Himalaya"/>
+        <a:font script="Thaa" typeface="MV Boli"/>
+        <a:font script="Deva" typeface="Mangal"/>
+        <a:font script="Telu" typeface="Gautami"/>
+        <a:font script="Taml" typeface="Latha"/>
+        <a:font script="Syrc" typeface="Estrangelo Edessa"/>
+        <a:font script="Orya" typeface="Kalinga"/>
+        <a:font script="Mlym" typeface="Kartika"/>
+        <a:font script="Laoo" typeface="DokChampa"/>
+        <a:font script="Sinh" typeface="Iskoola Pota"/>
+        <a:font script="Mong" typeface="Mongolian Baiti"/>
+        <a:font script="Viet" typeface="Times New Roman"/>
+        <a:font script="Uigh" typeface="Microsoft Uighur"/>
+        <a:font script="Geor" typeface="Sylfaen"/>
+        <a:font script="Armn" typeface="Arial"/>
+        <a:font script="Bugi" typeface="Leelawadee UI"/>
+        <a:font script="Bopo" typeface="Microsoft JhengHei"/>
+        <a:font script="Java" typeface="Javanese Text"/>
+        <a:font script="Lisu" typeface="Segoe UI"/>
+        <a:font script="Mymr" typeface="Myanmar Text"/>
+        <a:font script="Nkoo" typeface="Ebrima"/>
+        <a:font script="Olck" typeface="Nirmala UI"/>
+        <a:font script="Osma" typeface="Ebrima"/>
+        <a:font script="Phag" typeface="Phagspa"/>
+        <a:font script="Syrn" typeface="Estrangelo Edessa"/>
+        <a:font script="Syrj" typeface="Estrangelo Edessa"/>
+        <a:font script="Syre" typeface="Estrangelo Edessa"/>
+        <a:font script="Sora" typeface="Nirmala UI"/>
+        <a:font script="Tale" typeface="Microsoft Tai Le"/>
+        <a:font script="Talu" typeface="Microsoft New Tai Lue"/>
+        <a:font script="Tfng" typeface="Ebrima"/>
+      </a:majorFont>
+      <a:minorFont>
+        <a:latin typeface="游ゴシック" panose="020F0502020204030204"/>
+        <a:ea typeface=""/>
+        <a:cs typeface=""/>
+        <a:font script="Jpan" typeface="游ゴシック"/>
+        <a:font script="Hang" typeface="맑은 고딕"/>
+        <a:font script="Hans" typeface="等线"/>
+        <a:font script="Hant" typeface="新細明體"/>
+        <a:font script="Arab" typeface="Arial"/>
+        <a:font script="Hebr" typeface="Arial"/>
+        <a:font script="Thai" typeface="Cordia New"/>
+        <a:font script="Ethi" typeface="Nyala"/>
+        <a:font script="Beng" typeface="Vrinda"/>
+        <a:font script="Gujr" typeface="Shruti"/>
+        <a:font script="Khmr" typeface="DaunPenh"/>
+        <a:font script="Knda" typeface="Tunga"/>
+        <a:font script="Guru" typeface="Raavi"/>
+        <a:font script="Cans" typeface="Euphemia"/>
+        <a:font script="Cher" typeface="Plantagenet Cherokee"/>
+        <a:font script="Yiii" typeface="Microsoft Yi Baiti"/>
+        <a:font script="Tibt" typeface="Microsoft Himalaya"/>
+        <a:font script="Thaa" typeface="MV Boli"/>
+        <a:font script="Deva" typeface="Mangal"/>
+        <a:font script="Telu" typeface="Gautami"/>
+        <a:font script="Taml" typeface="Latha"/>
+        <a:font script="Syrc" typeface="Estrangelo Edessa"/>
+        <a:font script="Orya" typeface="Kalinga"/>
+        <a:font script="Mlym" typeface="Kartika"/>
+        <a:font script="Laoo" typeface="DokChampa"/>
+        <a:font script="Sinh" typeface="Iskoola Pota"/>
+        <a:font script="Mong" typeface="Mongolian Baiti"/>
+        <a:font script="Viet" typeface="Arial"/>
+        <a:font script="Uigh" typeface="Microsoft Uighur"/>
+        <a:font script="Geor" typeface="Sylfaen"/>
+        <a:font script="Armn" typeface="Arial"/>
+        <a:font script="Bugi" typeface="Leelawadee UI"/>
+        <a:font script="Bopo" typeface="Microsoft JhengHei"/>
+        <a:font script="Java" typeface="Javanese Text"/>
+        <a:font script="Lisu" typeface="Segoe UI"/>
+        <a:font script="Mymr" typeface="Myanmar Text"/>
+        <a:font script="Nkoo" typeface="Ebrima"/>
+        <a:font script="Olck" typeface="Nirmala UI"/>
+        <a:font script="Osma" typeface="Ebrima"/>
+        <a:font script="Phag" typeface="Phagspa"/>
+        <a:font script="Syrn" typeface="Estrangelo Edessa"/>
+        <a:font script="Syrj" typeface="Estrangelo Edessa"/>
+        <a:font script="Syre" typeface="Estrangelo Edessa"/>
+        <a:font script="Sora" typeface="Nirmala UI"/>
+        <a:font script="Tale" typeface="Microsoft Tai Le"/>
+        <a:font script="Talu" typeface="Microsoft New Tai Lue"/>
+        <a:font script="Tfng" typeface="Ebrima"/>
+      </a:minorFont>
+    </a:fontScheme>
+    <a:fmtScheme name="Office">
+      <a:fillStyleLst>
+        <a:solidFill>
+          <a:schemeClr val="phClr"/>
+        </a:solidFill>
+        <a:gradFill rotWithShape="1">
+          <a:gsLst>
+            <a:gs pos="0">
+              <a:schemeClr val="phClr">
+                <a:lumMod val="110000"/>
+                <a:satMod val="105000"/>
+                <a:tint val="67000"/>
+              </a:schemeClr>
+            </a:gs>
+            <a:gs pos="50000">
+              <a:schemeClr val="phClr">
+                <a:lumMod val="105000"/>
+                <a:satMod val="103000"/>
+                <a:tint val="73000"/>
+              </a:schemeClr>
+            </a:gs>
+            <a:gs pos="100000">
+              <a:schemeClr val="phClr">
+                <a:lumMod val="105000"/>
+                <a:satMod val="109000"/>
+                <a:tint val="81000"/>
+              </a:schemeClr>
+            </a:gs>
+          </a:gsLst>
+          <a:lin ang="5400000" scaled="0"/>
+        </a:gradFill>
+        <a:gradFill rotWithShape="1">
+          <a:gsLst>
+            <a:gs pos="0">
+              <a:schemeClr val="phClr">
+                <a:satMod val="103000"/>
+                <a:lumMod val="102000"/>
+                <a:tint val="94000"/>
+              </a:schemeClr>
+            </a:gs>
+            <a:gs pos="50000">
+              <a:schemeClr val="phClr">
+                <a:satMod val="110000"/>
+                <a:lumMod val="100000"/>
+                <a:shade val="100000"/>
+              </a:schemeClr>
+            </a:gs>
+            <a:gs pos="100000">
+              <a:schemeClr val="phClr">
+                <a:lumMod val="99000"/>
+                <a:satMod val="120000"/>
+                <a:shade val="78000"/>
+              </a:schemeClr>
+            </a:gs>
+          </a:gsLst>
+          <a:lin ang="5400000" scaled="0"/>
+        </a:gradFill>
+      </a:fillStyleLst>
+      <a:lnStyleLst>
+        <a:ln w="6350" cap="flat" cmpd="sng" algn="ctr">
+          <a:solidFill>
+            <a:schemeClr val="phClr"/>
+          </a:solidFill>
+          <a:prstDash val="solid"/>
+          <a:miter lim="800000"/>
+        </a:ln>
+        <a:ln w="12700" cap="flat" cmpd="sng" algn="ctr">
+          <a:solidFill>
+            <a:schemeClr val="phClr"/>
+          </a:solidFill>
+          <a:prstDash val="solid"/>
+          <a:miter lim="800000"/>
+        </a:ln>
+        <a:ln w="19050" cap="flat" cmpd="sng" algn="ctr">
+          <a:solidFill>
+            <a:schemeClr val="phClr"/>
+          </a:solidFill>
+          <a:prstDash val="solid"/>
+          <a:miter lim="800000"/>
+        </a:ln>
+      </a:lnStyleLst>
+      <a:effectStyleLst>
+        <a:effectStyle>
+          <a:effectLst/>
+        </a:effectStyle>
+        <a:effectStyle>
+          <a:effectLst/>
+        </a:effectStyle>
+        <a:effectStyle>
+          <a:effectLst>
+            <a:outerShdw blurRad="57150" dist="19050" dir="5400000" algn="ctr" rotWithShape="0">
+              <a:srgbClr val="000000">
+                <a:alpha val="63000"/>
+              </a:srgbClr>
+            </a:outerShdw>
+          </a:effectLst>
+        </a:effectStyle>
+      </a:effectStyleLst>
+      <a:bgFillStyleLst>
+        <a:solidFill>
+          <a:schemeClr val="phClr"/>
+        </a:solidFill>
+        <a:solidFill>
+          <a:schemeClr val="phClr">
+            <a:tint val="95000"/>
+            <a:satMod val="170000"/>
+          </a:schemeClr>
+        </a:solidFill>
+        <a:gradFill rotWithShape="1">
+          <a:gsLst>
+            <a:gs pos="0">
+              <a:schemeClr val="phClr">
+                <a:tint val="93000"/>
+                <a:satMod val="150000"/>
+                <a:shade val="98000"/>
+                <a:lumMod val="102000"/>
+              </a:schemeClr>
+            </a:gs>
+            <a:gs pos="50000">
+              <a:schemeClr val="phClr">
+                <a:tint val="98000"/>
+                <a:satMod val="130000"/>
+                <a:shade val="90000"/>
+                <a:lumMod val="103000"/>
+              </a:schemeClr>
+            </a:gs>
+            <a:gs pos="100000">
+              <a:schemeClr val="phClr">
+                <a:shade val="63000"/>
+                <a:satMod val="120000"/>
+              </a:schemeClr>
+            </a:gs>
+          </a:gsLst>
+          <a:lin ang="5400000" scaled="0"/>
+        </a:gradFill>
+      </a:bgFillStyleLst>
+    </a:fmtScheme>
+  </a:themeElements>
+  <a:objectDefaults/>
+  <a:extraClrSchemeLst/>
+  <a:extLst>
+    <a:ext uri="{05A4C25C-085E-4340-85A3-A5531E510DB2}">
+      <thm15:themeFamily xmlns:thm15="http://schemas.microsoft.com/office/thememl/2012/main" name="Office Theme" id="{62F939B6-93AF-4DB8-9C6B-D6C7DFDC589F}" vid="{4A3C46E8-61CC-4603-A589-7422A47A8E4A}"/>
+    </a:ext>
+  </a:extLst>
+</a:theme>
 </file>
</xml_diff>